<commit_message>
just added a few more things
</commit_message>
<xml_diff>
--- a/Rossman Project.pptx
+++ b/Rossman Project.pptx
@@ -5,10 +5,10 @@
     <p:sldMasterId id="2147483648" r:id="rId2"/>
   </p:sldMasterIdLst>
   <p:notesMasterIdLst>
-    <p:notesMasterId r:id="rId14"/>
+    <p:notesMasterId r:id="rId19"/>
   </p:notesMasterIdLst>
   <p:handoutMasterIdLst>
-    <p:handoutMasterId r:id="rId15"/>
+    <p:handoutMasterId r:id="rId20"/>
   </p:handoutMasterIdLst>
   <p:sldIdLst>
     <p:sldId id="265" r:id="rId3"/>
@@ -16,17 +16,22 @@
     <p:sldId id="319" r:id="rId5"/>
     <p:sldId id="323" r:id="rId6"/>
     <p:sldId id="326" r:id="rId7"/>
-    <p:sldId id="321" r:id="rId8"/>
-    <p:sldId id="325" r:id="rId9"/>
-    <p:sldId id="317" r:id="rId10"/>
-    <p:sldId id="322" r:id="rId11"/>
-    <p:sldId id="324" r:id="rId12"/>
-    <p:sldId id="327" r:id="rId13"/>
+    <p:sldId id="330" r:id="rId8"/>
+    <p:sldId id="332" r:id="rId9"/>
+    <p:sldId id="321" r:id="rId10"/>
+    <p:sldId id="325" r:id="rId11"/>
+    <p:sldId id="317" r:id="rId12"/>
+    <p:sldId id="329" r:id="rId13"/>
+    <p:sldId id="328" r:id="rId14"/>
+    <p:sldId id="322" r:id="rId15"/>
+    <p:sldId id="324" r:id="rId16"/>
+    <p:sldId id="327" r:id="rId17"/>
+    <p:sldId id="331" r:id="rId18"/>
   </p:sldIdLst>
   <p:sldSz cx="12188825" cy="6858000"/>
   <p:notesSz cx="6858000" cy="9144000"/>
   <p:custDataLst>
-    <p:tags r:id="rId16"/>
+    <p:tags r:id="rId21"/>
   </p:custDataLst>
   <p:defaultTextStyle>
     <a:defPPr>
@@ -4097,7 +4102,7 @@
           <a:p>
             <a:r>
               <a:rPr lang="en-US" dirty="0" smtClean="0"/>
-              <a:t>Plans for data modeling</a:t>
+              <a:t>Exploratory Data Analysis</a:t>
             </a:r>
             <a:endParaRPr lang="en-US" dirty="0"/>
           </a:p>
@@ -4125,7 +4130,7 @@
     </p:spTree>
     <p:extLst>
       <p:ext uri="{BB962C8B-B14F-4D97-AF65-F5344CB8AC3E}">
-        <p14:creationId xmlns:p14="http://schemas.microsoft.com/office/powerpoint/2010/main" val="2308382696"/>
+        <p14:creationId xmlns:p14="http://schemas.microsoft.com/office/powerpoint/2010/main" val="1735722345"/>
       </p:ext>
     </p:extLst>
   </p:cSld>
@@ -4179,10 +4184,370 @@
           <a:bodyPr/>
           <a:lstStyle/>
           <a:p>
+            <a:r>
+              <a:rPr lang="en-US" dirty="0" smtClean="0"/>
+              <a:t>Univariate EDA</a:t>
+            </a:r>
+            <a:endParaRPr lang="en-US" dirty="0"/>
+          </a:p>
+        </p:txBody>
+      </p:sp>
+      <p:sp>
+        <p:nvSpPr>
+          <p:cNvPr id="3" name="Text Placeholder 2"/>
+          <p:cNvSpPr>
+            <a:spLocks noGrp="1"/>
+          </p:cNvSpPr>
+          <p:nvPr>
+            <p:ph type="body" idx="1"/>
+          </p:nvPr>
+        </p:nvSpPr>
+        <p:spPr/>
+        <p:txBody>
+          <a:bodyPr/>
+          <a:lstStyle/>
+          <a:p>
             <a:endParaRPr lang="en-US"/>
           </a:p>
         </p:txBody>
       </p:sp>
+    </p:spTree>
+    <p:extLst>
+      <p:ext uri="{BB962C8B-B14F-4D97-AF65-F5344CB8AC3E}">
+        <p14:creationId xmlns:p14="http://schemas.microsoft.com/office/powerpoint/2010/main" val="662352694"/>
+      </p:ext>
+    </p:extLst>
+  </p:cSld>
+  <p:clrMapOvr>
+    <a:masterClrMapping/>
+  </p:clrMapOvr>
+  <mc:AlternateContent xmlns:mc="http://schemas.openxmlformats.org/markup-compatibility/2006" xmlns:p14="http://schemas.microsoft.com/office/powerpoint/2010/main">
+    <mc:Choice Requires="p14">
+      <p:transition spd="med" p14:dur="700">
+        <p:fade/>
+      </p:transition>
+    </mc:Choice>
+    <mc:Fallback xmlns="">
+      <p:transition spd="med">
+        <p:fade/>
+      </p:transition>
+    </mc:Fallback>
+  </mc:AlternateContent>
+</p:sld>
+</file>
+
+<file path=ppt/slides/slide12.xml><?xml version="1.0" encoding="utf-8"?>
+<p:sld xmlns:a="http://schemas.openxmlformats.org/drawingml/2006/main" xmlns:r="http://schemas.openxmlformats.org/officeDocument/2006/relationships" xmlns:p="http://schemas.openxmlformats.org/presentationml/2006/main">
+  <p:cSld>
+    <p:spTree>
+      <p:nvGrpSpPr>
+        <p:cNvPr id="1" name=""/>
+        <p:cNvGrpSpPr/>
+        <p:nvPr/>
+      </p:nvGrpSpPr>
+      <p:grpSpPr>
+        <a:xfrm>
+          <a:off x="0" y="0"/>
+          <a:ext cx="0" cy="0"/>
+          <a:chOff x="0" y="0"/>
+          <a:chExt cx="0" cy="0"/>
+        </a:xfrm>
+      </p:grpSpPr>
+      <p:sp>
+        <p:nvSpPr>
+          <p:cNvPr id="2" name="Title 1"/>
+          <p:cNvSpPr>
+            <a:spLocks noGrp="1"/>
+          </p:cNvSpPr>
+          <p:nvPr>
+            <p:ph type="title"/>
+          </p:nvPr>
+        </p:nvSpPr>
+        <p:spPr/>
+        <p:txBody>
+          <a:bodyPr/>
+          <a:lstStyle/>
+          <a:p>
+            <a:r>
+              <a:rPr lang="en-US" dirty="0" smtClean="0"/>
+              <a:t>Bivariate EDA</a:t>
+            </a:r>
+            <a:endParaRPr lang="en-US" dirty="0"/>
+          </a:p>
+        </p:txBody>
+      </p:sp>
+      <p:sp>
+        <p:nvSpPr>
+          <p:cNvPr id="3" name="Text Placeholder 2"/>
+          <p:cNvSpPr>
+            <a:spLocks noGrp="1"/>
+          </p:cNvSpPr>
+          <p:nvPr>
+            <p:ph type="body" idx="1"/>
+          </p:nvPr>
+        </p:nvSpPr>
+        <p:spPr/>
+        <p:txBody>
+          <a:bodyPr/>
+          <a:lstStyle/>
+          <a:p>
+            <a:endParaRPr lang="en-US"/>
+          </a:p>
+        </p:txBody>
+      </p:sp>
+    </p:spTree>
+    <p:extLst>
+      <p:ext uri="{BB962C8B-B14F-4D97-AF65-F5344CB8AC3E}">
+        <p14:creationId xmlns:p14="http://schemas.microsoft.com/office/powerpoint/2010/main" val="4047463567"/>
+      </p:ext>
+    </p:extLst>
+  </p:cSld>
+  <p:clrMapOvr>
+    <a:masterClrMapping/>
+  </p:clrMapOvr>
+  <mc:AlternateContent xmlns:mc="http://schemas.openxmlformats.org/markup-compatibility/2006" xmlns:p14="http://schemas.microsoft.com/office/powerpoint/2010/main">
+    <mc:Choice Requires="p14">
+      <p:transition spd="med" p14:dur="700">
+        <p:fade/>
+      </p:transition>
+    </mc:Choice>
+    <mc:Fallback xmlns="">
+      <p:transition spd="med">
+        <p:fade/>
+      </p:transition>
+    </mc:Fallback>
+  </mc:AlternateContent>
+</p:sld>
+</file>
+
+<file path=ppt/slides/slide13.xml><?xml version="1.0" encoding="utf-8"?>
+<p:sld xmlns:a="http://schemas.openxmlformats.org/drawingml/2006/main" xmlns:r="http://schemas.openxmlformats.org/officeDocument/2006/relationships" xmlns:p="http://schemas.openxmlformats.org/presentationml/2006/main">
+  <p:cSld>
+    <p:spTree>
+      <p:nvGrpSpPr>
+        <p:cNvPr id="1" name=""/>
+        <p:cNvGrpSpPr/>
+        <p:nvPr/>
+      </p:nvGrpSpPr>
+      <p:grpSpPr>
+        <a:xfrm>
+          <a:off x="0" y="0"/>
+          <a:ext cx="0" cy="0"/>
+          <a:chOff x="0" y="0"/>
+          <a:chExt cx="0" cy="0"/>
+        </a:xfrm>
+      </p:grpSpPr>
+      <p:sp>
+        <p:nvSpPr>
+          <p:cNvPr id="2" name="Title 1"/>
+          <p:cNvSpPr>
+            <a:spLocks noGrp="1"/>
+          </p:cNvSpPr>
+          <p:nvPr>
+            <p:ph type="title"/>
+          </p:nvPr>
+        </p:nvSpPr>
+        <p:spPr>
+          <a:xfrm>
+            <a:off x="1532115" y="304800"/>
+            <a:ext cx="9144001" cy="762000"/>
+          </a:xfrm>
+        </p:spPr>
+        <p:txBody>
+          <a:bodyPr/>
+          <a:lstStyle/>
+          <a:p>
+            <a:r>
+              <a:rPr lang="en-US" dirty="0" smtClean="0"/>
+              <a:t>Sales vs. Total Customers/Store Type </a:t>
+            </a:r>
+            <a:endParaRPr lang="en-US" dirty="0"/>
+          </a:p>
+        </p:txBody>
+      </p:sp>
+      <p:pic>
+        <p:nvPicPr>
+          <p:cNvPr id="4" name="Content Placeholder 3"/>
+          <p:cNvPicPr>
+            <a:picLocks noGrp="1" noChangeAspect="1"/>
+          </p:cNvPicPr>
+          <p:nvPr>
+            <p:ph idx="1"/>
+          </p:nvPr>
+        </p:nvPicPr>
+        <p:blipFill>
+          <a:blip r:embed="rId2">
+            <a:extLst>
+              <a:ext uri="{28A0092B-C50C-407E-A947-70E740481C1C}">
+                <a14:useLocalDpi xmlns:a14="http://schemas.microsoft.com/office/drawing/2010/main" val="0"/>
+              </a:ext>
+            </a:extLst>
+          </a:blip>
+          <a:stretch>
+            <a:fillRect/>
+          </a:stretch>
+        </p:blipFill>
+        <p:spPr>
+          <a:xfrm>
+            <a:off x="1065212" y="1295399"/>
+            <a:ext cx="9296400" cy="5383848"/>
+          </a:xfrm>
+        </p:spPr>
+      </p:pic>
+    </p:spTree>
+    <p:extLst>
+      <p:ext uri="{BB962C8B-B14F-4D97-AF65-F5344CB8AC3E}">
+        <p14:creationId xmlns:p14="http://schemas.microsoft.com/office/powerpoint/2010/main" val="3602508205"/>
+      </p:ext>
+    </p:extLst>
+  </p:cSld>
+  <p:clrMapOvr>
+    <a:masterClrMapping/>
+  </p:clrMapOvr>
+  <mc:AlternateContent xmlns:mc="http://schemas.openxmlformats.org/markup-compatibility/2006" xmlns:p14="http://schemas.microsoft.com/office/powerpoint/2010/main">
+    <mc:Choice Requires="p14">
+      <p:transition spd="med" p14:dur="700">
+        <p:fade/>
+      </p:transition>
+    </mc:Choice>
+    <mc:Fallback xmlns="">
+      <p:transition spd="med">
+        <p:fade/>
+      </p:transition>
+    </mc:Fallback>
+  </mc:AlternateContent>
+</p:sld>
+</file>
+
+<file path=ppt/slides/slide14.xml><?xml version="1.0" encoding="utf-8"?>
+<p:sld xmlns:a="http://schemas.openxmlformats.org/drawingml/2006/main" xmlns:r="http://schemas.openxmlformats.org/officeDocument/2006/relationships" xmlns:p="http://schemas.openxmlformats.org/presentationml/2006/main">
+  <p:cSld>
+    <p:spTree>
+      <p:nvGrpSpPr>
+        <p:cNvPr id="1" name=""/>
+        <p:cNvGrpSpPr/>
+        <p:nvPr/>
+      </p:nvGrpSpPr>
+      <p:grpSpPr>
+        <a:xfrm>
+          <a:off x="0" y="0"/>
+          <a:ext cx="0" cy="0"/>
+          <a:chOff x="0" y="0"/>
+          <a:chExt cx="0" cy="0"/>
+        </a:xfrm>
+      </p:grpSpPr>
+      <p:sp>
+        <p:nvSpPr>
+          <p:cNvPr id="2" name="Title 1"/>
+          <p:cNvSpPr>
+            <a:spLocks noGrp="1"/>
+          </p:cNvSpPr>
+          <p:nvPr>
+            <p:ph type="title"/>
+          </p:nvPr>
+        </p:nvSpPr>
+        <p:spPr/>
+        <p:txBody>
+          <a:bodyPr/>
+          <a:lstStyle/>
+          <a:p>
+            <a:r>
+              <a:rPr lang="en-US" dirty="0" smtClean="0"/>
+              <a:t>Plans for data modeling</a:t>
+            </a:r>
+            <a:endParaRPr lang="en-US" dirty="0"/>
+          </a:p>
+        </p:txBody>
+      </p:sp>
+      <p:sp>
+        <p:nvSpPr>
+          <p:cNvPr id="3" name="Text Placeholder 2"/>
+          <p:cNvSpPr>
+            <a:spLocks noGrp="1"/>
+          </p:cNvSpPr>
+          <p:nvPr>
+            <p:ph type="body" idx="1"/>
+          </p:nvPr>
+        </p:nvSpPr>
+        <p:spPr/>
+        <p:txBody>
+          <a:bodyPr/>
+          <a:lstStyle/>
+          <a:p>
+            <a:endParaRPr lang="en-US"/>
+          </a:p>
+        </p:txBody>
+      </p:sp>
+    </p:spTree>
+    <p:extLst>
+      <p:ext uri="{BB962C8B-B14F-4D97-AF65-F5344CB8AC3E}">
+        <p14:creationId xmlns:p14="http://schemas.microsoft.com/office/powerpoint/2010/main" val="2308382696"/>
+      </p:ext>
+    </p:extLst>
+  </p:cSld>
+  <p:clrMapOvr>
+    <a:masterClrMapping/>
+  </p:clrMapOvr>
+  <mc:AlternateContent xmlns:mc="http://schemas.openxmlformats.org/markup-compatibility/2006" xmlns:p14="http://schemas.microsoft.com/office/powerpoint/2010/main">
+    <mc:Choice Requires="p14">
+      <p:transition spd="med" p14:dur="700">
+        <p:fade/>
+      </p:transition>
+    </mc:Choice>
+    <mc:Fallback xmlns="">
+      <p:transition spd="med">
+        <p:fade/>
+      </p:transition>
+    </mc:Fallback>
+  </mc:AlternateContent>
+</p:sld>
+</file>
+
+<file path=ppt/slides/slide15.xml><?xml version="1.0" encoding="utf-8"?>
+<p:sld xmlns:a="http://schemas.openxmlformats.org/drawingml/2006/main" xmlns:r="http://schemas.openxmlformats.org/officeDocument/2006/relationships" xmlns:p="http://schemas.openxmlformats.org/presentationml/2006/main">
+  <p:cSld>
+    <p:spTree>
+      <p:nvGrpSpPr>
+        <p:cNvPr id="1" name=""/>
+        <p:cNvGrpSpPr/>
+        <p:nvPr/>
+      </p:nvGrpSpPr>
+      <p:grpSpPr>
+        <a:xfrm>
+          <a:off x="0" y="0"/>
+          <a:ext cx="0" cy="0"/>
+          <a:chOff x="0" y="0"/>
+          <a:chExt cx="0" cy="0"/>
+        </a:xfrm>
+      </p:grpSpPr>
+      <p:sp>
+        <p:nvSpPr>
+          <p:cNvPr id="2" name="Title 1"/>
+          <p:cNvSpPr>
+            <a:spLocks noGrp="1"/>
+          </p:cNvSpPr>
+          <p:nvPr>
+            <p:ph type="title"/>
+          </p:nvPr>
+        </p:nvSpPr>
+        <p:spPr>
+          <a:xfrm>
+            <a:off x="912812" y="152400"/>
+            <a:ext cx="9144001" cy="762000"/>
+          </a:xfrm>
+        </p:spPr>
+        <p:txBody>
+          <a:bodyPr/>
+          <a:lstStyle/>
+          <a:p>
+            <a:r>
+              <a:rPr lang="en-US" dirty="0" smtClean="0"/>
+              <a:t>Modeling Techniques To Consider: </a:t>
+            </a:r>
+            <a:endParaRPr lang="en-US" dirty="0"/>
+          </a:p>
+        </p:txBody>
+      </p:sp>
       <p:sp>
         <p:nvSpPr>
           <p:cNvPr id="3" name="Content Placeholder 2"/>
@@ -4193,12 +4558,81 @@
             <p:ph idx="1"/>
           </p:nvPr>
         </p:nvSpPr>
-        <p:spPr/>
-        <p:txBody>
-          <a:bodyPr/>
-          <a:lstStyle/>
-          <a:p>
-            <a:endParaRPr lang="en-US"/>
+        <p:spPr>
+          <a:xfrm>
+            <a:off x="1065212" y="1066800"/>
+            <a:ext cx="10134600" cy="5257800"/>
+          </a:xfrm>
+        </p:spPr>
+        <p:txBody>
+          <a:bodyPr>
+            <a:normAutofit/>
+          </a:bodyPr>
+          <a:lstStyle/>
+          <a:p>
+            <a:r>
+              <a:rPr lang="en-US" dirty="0" smtClean="0"/>
+              <a:t>Traditional Linear Regression </a:t>
+            </a:r>
+          </a:p>
+          <a:p>
+            <a:pPr lvl="1"/>
+            <a:r>
+              <a:rPr lang="en-US" dirty="0" smtClean="0"/>
+              <a:t>Start with stepwise selection for dimension reduction </a:t>
+            </a:r>
+          </a:p>
+          <a:p>
+            <a:pPr lvl="1"/>
+            <a:r>
+              <a:rPr lang="en-US" dirty="0" smtClean="0"/>
+              <a:t>Determine optimal # of dimensions based on AIC </a:t>
+            </a:r>
+          </a:p>
+          <a:p>
+            <a:r>
+              <a:rPr lang="en-US" dirty="0" smtClean="0"/>
+              <a:t>Decision Trees</a:t>
+            </a:r>
+          </a:p>
+          <a:p>
+            <a:pPr lvl="1"/>
+            <a:r>
+              <a:rPr lang="en-US" dirty="0" smtClean="0"/>
+              <a:t>Start will all dimensions</a:t>
+            </a:r>
+          </a:p>
+          <a:p>
+            <a:pPr lvl="1"/>
+            <a:r>
+              <a:rPr lang="en-US" dirty="0" smtClean="0"/>
+              <a:t>Prune tree to find most parsimonious model </a:t>
+            </a:r>
+          </a:p>
+          <a:p>
+            <a:r>
+              <a:rPr lang="en-US" dirty="0" smtClean="0"/>
+              <a:t>Bagging </a:t>
+            </a:r>
+          </a:p>
+          <a:p>
+            <a:pPr lvl="1"/>
+            <a:endParaRPr lang="en-US" dirty="0" smtClean="0"/>
+          </a:p>
+          <a:p>
+            <a:r>
+              <a:rPr lang="en-US" dirty="0" smtClean="0"/>
+              <a:t>Random Forest </a:t>
+            </a:r>
+          </a:p>
+          <a:p>
+            <a:r>
+              <a:rPr lang="en-US" dirty="0" smtClean="0"/>
+              <a:t>Boosting </a:t>
+            </a:r>
+          </a:p>
+          <a:p>
+            <a:endParaRPr lang="en-US" dirty="0"/>
           </a:p>
         </p:txBody>
       </p:sp>
@@ -4206,6 +4640,122 @@
     <p:extLst>
       <p:ext uri="{BB962C8B-B14F-4D97-AF65-F5344CB8AC3E}">
         <p14:creationId xmlns:p14="http://schemas.microsoft.com/office/powerpoint/2010/main" val="1561251691"/>
+      </p:ext>
+    </p:extLst>
+  </p:cSld>
+  <p:clrMapOvr>
+    <a:masterClrMapping/>
+  </p:clrMapOvr>
+  <mc:AlternateContent xmlns:mc="http://schemas.openxmlformats.org/markup-compatibility/2006" xmlns:p14="http://schemas.microsoft.com/office/powerpoint/2010/main">
+    <mc:Choice Requires="p14">
+      <p:transition spd="med" p14:dur="700">
+        <p:fade/>
+      </p:transition>
+    </mc:Choice>
+    <mc:Fallback xmlns="">
+      <p:transition spd="med">
+        <p:fade/>
+      </p:transition>
+    </mc:Fallback>
+  </mc:AlternateContent>
+</p:sld>
+</file>
+
+<file path=ppt/slides/slide16.xml><?xml version="1.0" encoding="utf-8"?>
+<p:sld xmlns:a="http://schemas.openxmlformats.org/drawingml/2006/main" xmlns:r="http://schemas.openxmlformats.org/officeDocument/2006/relationships" xmlns:p="http://schemas.openxmlformats.org/presentationml/2006/main">
+  <p:cSld>
+    <p:spTree>
+      <p:nvGrpSpPr>
+        <p:cNvPr id="1" name=""/>
+        <p:cNvGrpSpPr/>
+        <p:nvPr/>
+      </p:nvGrpSpPr>
+      <p:grpSpPr>
+        <a:xfrm>
+          <a:off x="0" y="0"/>
+          <a:ext cx="0" cy="0"/>
+          <a:chOff x="0" y="0"/>
+          <a:chExt cx="0" cy="0"/>
+        </a:xfrm>
+      </p:grpSpPr>
+      <p:sp>
+        <p:nvSpPr>
+          <p:cNvPr id="2" name="Title 1"/>
+          <p:cNvSpPr>
+            <a:spLocks noGrp="1"/>
+          </p:cNvSpPr>
+          <p:nvPr>
+            <p:ph type="title"/>
+          </p:nvPr>
+        </p:nvSpPr>
+        <p:spPr>
+          <a:xfrm>
+            <a:off x="1512803" y="533400"/>
+            <a:ext cx="9144001" cy="762000"/>
+          </a:xfrm>
+        </p:spPr>
+        <p:txBody>
+          <a:bodyPr/>
+          <a:lstStyle/>
+          <a:p>
+            <a:r>
+              <a:rPr lang="en-US" dirty="0" smtClean="0"/>
+              <a:t>General Modeling Parameters</a:t>
+            </a:r>
+            <a:endParaRPr lang="en-US" dirty="0"/>
+          </a:p>
+        </p:txBody>
+      </p:sp>
+      <p:sp>
+        <p:nvSpPr>
+          <p:cNvPr id="3" name="Content Placeholder 2"/>
+          <p:cNvSpPr>
+            <a:spLocks noGrp="1"/>
+          </p:cNvSpPr>
+          <p:nvPr>
+            <p:ph idx="1"/>
+          </p:nvPr>
+        </p:nvSpPr>
+        <p:spPr>
+          <a:xfrm>
+            <a:off x="836612" y="1600201"/>
+            <a:ext cx="10667999" cy="4419600"/>
+          </a:xfrm>
+        </p:spPr>
+        <p:txBody>
+          <a:bodyPr/>
+          <a:lstStyle/>
+          <a:p>
+            <a:r>
+              <a:rPr lang="en-US" dirty="0" smtClean="0"/>
+              <a:t>Models will be </a:t>
+            </a:r>
+            <a:r>
+              <a:rPr lang="en-US" dirty="0" smtClean="0"/>
+              <a:t>optimized using 5-Fold Cross Validation  and the Caret Package </a:t>
+            </a:r>
+          </a:p>
+          <a:p>
+            <a:pPr lvl="1"/>
+            <a:r>
+              <a:rPr lang="en-US" dirty="0" smtClean="0"/>
+              <a:t>Regression will use lowest 5-Fold RMSE</a:t>
+            </a:r>
+          </a:p>
+          <a:p>
+            <a:pPr lvl="1"/>
+            <a:r>
+              <a:rPr lang="en-US" dirty="0" smtClean="0"/>
+              <a:t> </a:t>
+            </a:r>
+            <a:endParaRPr lang="en-US" dirty="0"/>
+          </a:p>
+        </p:txBody>
+      </p:sp>
+    </p:spTree>
+    <p:extLst>
+      <p:ext uri="{BB962C8B-B14F-4D97-AF65-F5344CB8AC3E}">
+        <p14:creationId xmlns:p14="http://schemas.microsoft.com/office/powerpoint/2010/main" val="2326110029"/>
       </p:ext>
     </p:extLst>
   </p:cSld>
@@ -4464,7 +5014,7 @@
           <a:bodyPr/>
           <a:lstStyle/>
           <a:p>
-            <a:endParaRPr lang="en-US"/>
+            <a:endParaRPr lang="en-US" dirty="0"/>
           </a:p>
         </p:txBody>
       </p:sp>
@@ -4604,42 +5154,112 @@
             <p:ph type="title"/>
           </p:nvPr>
         </p:nvSpPr>
-        <p:spPr/>
+        <p:spPr>
+          <a:xfrm>
+            <a:off x="1217612" y="381000"/>
+            <a:ext cx="9144001" cy="914400"/>
+          </a:xfrm>
+        </p:spPr>
         <p:txBody>
           <a:bodyPr/>
           <a:lstStyle/>
           <a:p>
             <a:r>
+              <a:rPr lang="en-US" u="sng" dirty="0" smtClean="0"/>
+              <a:t>Missing Values</a:t>
+            </a:r>
+            <a:endParaRPr lang="en-US" u="sng" dirty="0"/>
+          </a:p>
+        </p:txBody>
+      </p:sp>
+      <p:sp>
+        <p:nvSpPr>
+          <p:cNvPr id="3" name="Content Placeholder 2"/>
+          <p:cNvSpPr>
+            <a:spLocks noGrp="1"/>
+          </p:cNvSpPr>
+          <p:nvPr>
+            <p:ph idx="1"/>
+          </p:nvPr>
+        </p:nvSpPr>
+        <p:spPr>
+          <a:xfrm>
+            <a:off x="1227222" y="1676400"/>
+            <a:ext cx="9896390" cy="4114800"/>
+          </a:xfrm>
+        </p:spPr>
+        <p:txBody>
+          <a:bodyPr/>
+          <a:lstStyle/>
+          <a:p>
+            <a:r>
               <a:rPr lang="en-US" dirty="0" smtClean="0"/>
-              <a:t>Feature Engineering</a:t>
-            </a:r>
-            <a:endParaRPr lang="en-US" dirty="0"/>
-          </a:p>
-        </p:txBody>
-      </p:sp>
-      <p:sp>
-        <p:nvSpPr>
-          <p:cNvPr id="3" name="Text Placeholder 2"/>
-          <p:cNvSpPr>
-            <a:spLocks noGrp="1"/>
-          </p:cNvSpPr>
-          <p:nvPr>
-            <p:ph type="body" idx="1"/>
-          </p:nvPr>
-        </p:nvSpPr>
-        <p:spPr/>
-        <p:txBody>
-          <a:bodyPr/>
-          <a:lstStyle/>
-          <a:p>
-            <a:endParaRPr lang="en-US" dirty="0"/>
+              <a:t>Stores Dataset: </a:t>
+            </a:r>
+          </a:p>
+          <a:p>
+            <a:pPr lvl="1"/>
+            <a:r>
+              <a:rPr lang="en-US" dirty="0" smtClean="0"/>
+              <a:t>Competition Distance – only for 3 stores (81,862,957)</a:t>
+            </a:r>
+          </a:p>
+          <a:p>
+            <a:pPr marL="231775" lvl="1" indent="0">
+              <a:buNone/>
+            </a:pPr>
+            <a:endParaRPr lang="en-US" dirty="0" smtClean="0"/>
+          </a:p>
+          <a:p>
+            <a:pPr lvl="1"/>
+            <a:r>
+              <a:rPr lang="en-US" dirty="0" smtClean="0"/>
+              <a:t>Competition Open Since Month / Competition Open Since Year – 317 stores </a:t>
+            </a:r>
+          </a:p>
+          <a:p>
+            <a:pPr lvl="2"/>
+            <a:r>
+              <a:rPr lang="en-US" dirty="0" smtClean="0"/>
+              <a:t>Affects Competition </a:t>
+            </a:r>
+            <a:r>
+              <a:rPr lang="en-US" dirty="0"/>
+              <a:t>Open Date – if values are NA, </a:t>
+            </a:r>
+          </a:p>
+          <a:p>
+            <a:pPr lvl="2"/>
+            <a:endParaRPr lang="en-US" dirty="0" smtClean="0"/>
+          </a:p>
+          <a:p>
+            <a:pPr lvl="1"/>
+            <a:r>
+              <a:rPr lang="en-US" dirty="0" smtClean="0"/>
+              <a:t>Promo2 Since Week / Promo2 Since Year – 486 Stores </a:t>
+            </a:r>
+          </a:p>
+          <a:p>
+            <a:pPr lvl="2"/>
+            <a:r>
+              <a:rPr lang="en-US" dirty="0" smtClean="0"/>
+              <a:t>Affects </a:t>
+            </a:r>
+            <a:r>
+              <a:rPr lang="en-US" dirty="0"/>
+              <a:t>Promo2 – Appears if Promo2 = 0, it never was offered and the date values are truly unknown. </a:t>
+            </a:r>
+          </a:p>
+          <a:p>
+            <a:pPr lvl="2"/>
+            <a:endParaRPr lang="en-US" dirty="0" smtClean="0"/>
           </a:p>
         </p:txBody>
       </p:sp>
     </p:spTree>
     <p:extLst>
       <p:ext uri="{BB962C8B-B14F-4D97-AF65-F5344CB8AC3E}">
-        <p14:creationId xmlns:p14="http://schemas.microsoft.com/office/powerpoint/2010/main" val="4269104972"/>
+        <p14:creationId xmlns:p14="http://schemas.microsoft.com/office/powerpoint/2010/main" val="2673845013"/>
       </p:ext>
     </p:extLst>
   </p:cSld>
@@ -4688,12 +5308,25 @@
             <p:ph type="title"/>
           </p:nvPr>
         </p:nvSpPr>
-        <p:spPr/>
+        <p:spPr>
+          <a:xfrm>
+            <a:off x="1217612" y="381000"/>
+            <a:ext cx="9144001" cy="914400"/>
+          </a:xfrm>
+        </p:spPr>
         <p:txBody>
           <a:bodyPr/>
           <a:lstStyle/>
           <a:p>
-            <a:endParaRPr lang="en-US"/>
+            <a:r>
+              <a:rPr lang="en-US" u="sng" dirty="0" smtClean="0"/>
+              <a:t>Imputing Missing </a:t>
+            </a:r>
+            <a:r>
+              <a:rPr lang="en-US" u="sng" dirty="0" smtClean="0"/>
+              <a:t>Values</a:t>
+            </a:r>
+            <a:endParaRPr lang="en-US" u="sng" dirty="0"/>
           </a:p>
         </p:txBody>
       </p:sp>
@@ -4707,19 +5340,98 @@
             <p:ph idx="1"/>
           </p:nvPr>
         </p:nvSpPr>
-        <p:spPr/>
-        <p:txBody>
-          <a:bodyPr/>
-          <a:lstStyle/>
-          <a:p>
-            <a:endParaRPr lang="en-US"/>
+        <p:spPr>
+          <a:xfrm>
+            <a:off x="1065212" y="1600200"/>
+            <a:ext cx="10058400" cy="4648200"/>
+          </a:xfrm>
+        </p:spPr>
+        <p:txBody>
+          <a:bodyPr>
+            <a:normAutofit/>
+          </a:bodyPr>
+          <a:lstStyle/>
+          <a:p>
+            <a:pPr lvl="1"/>
+            <a:r>
+              <a:rPr lang="en-US" sz="2400" dirty="0" smtClean="0"/>
+              <a:t>Competition Distance –  May not be worth the time (3 stores)</a:t>
+            </a:r>
+          </a:p>
+          <a:p>
+            <a:pPr lvl="2"/>
+            <a:r>
+              <a:rPr lang="en-US" sz="2200" dirty="0" smtClean="0"/>
+              <a:t>No single other attribute appears to be predictive of Competition Distance</a:t>
+            </a:r>
+          </a:p>
+          <a:p>
+            <a:pPr lvl="2"/>
+            <a:r>
+              <a:rPr lang="en-US" sz="2200" dirty="0" smtClean="0"/>
+              <a:t>Perhaps we can use K-means clustering to find similar stores?</a:t>
+            </a:r>
+          </a:p>
+          <a:p>
+            <a:pPr lvl="3"/>
+            <a:r>
+              <a:rPr lang="en-US" sz="2000" dirty="0" smtClean="0"/>
+              <a:t>Then impute based on an average of Competition Distance of similar stores?</a:t>
+            </a:r>
+            <a:endParaRPr lang="en-US" sz="2000" dirty="0" smtClean="0"/>
+          </a:p>
+          <a:p>
+            <a:pPr lvl="1"/>
+            <a:endParaRPr lang="en-US" sz="2400" dirty="0" smtClean="0"/>
+          </a:p>
+          <a:p>
+            <a:pPr lvl="1"/>
+            <a:r>
+              <a:rPr lang="en-US" sz="2400" dirty="0" smtClean="0"/>
+              <a:t>Competition Open Date – Highly missing, but may be predictive </a:t>
+            </a:r>
+          </a:p>
+          <a:p>
+            <a:pPr lvl="2"/>
+            <a:r>
+              <a:rPr lang="en-US" sz="2200" dirty="0" smtClean="0"/>
+              <a:t>No other attributes seem to be predictive of Open Date</a:t>
+            </a:r>
+          </a:p>
+          <a:p>
+            <a:pPr lvl="2"/>
+            <a:r>
+              <a:rPr lang="en-US" sz="2200" dirty="0" smtClean="0"/>
+              <a:t>Perhaps we can use K-means clustering to find similar stores?</a:t>
+            </a:r>
+          </a:p>
+          <a:p>
+            <a:pPr marL="231775" lvl="1" indent="0">
+              <a:buNone/>
+            </a:pPr>
+            <a:endParaRPr lang="en-US" sz="2400" dirty="0" smtClean="0"/>
+          </a:p>
+          <a:p>
+            <a:pPr lvl="1"/>
+            <a:r>
+              <a:rPr lang="en-US" sz="2400" dirty="0" smtClean="0"/>
+              <a:t>Promo2 Start Date – No need</a:t>
+            </a:r>
+          </a:p>
+          <a:p>
+            <a:pPr lvl="2"/>
+            <a:r>
+              <a:rPr lang="en-US" sz="2200" dirty="0" smtClean="0"/>
+              <a:t>When Promo2 = 0, the promo was not offered</a:t>
+            </a:r>
+            <a:endParaRPr lang="en-US" sz="2200" dirty="0" smtClean="0"/>
           </a:p>
         </p:txBody>
       </p:sp>
     </p:spTree>
     <p:extLst>
       <p:ext uri="{BB962C8B-B14F-4D97-AF65-F5344CB8AC3E}">
-        <p14:creationId xmlns:p14="http://schemas.microsoft.com/office/powerpoint/2010/main" val="1691734402"/>
+        <p14:creationId xmlns:p14="http://schemas.microsoft.com/office/powerpoint/2010/main" val="2899287644"/>
       </p:ext>
     </p:extLst>
   </p:cSld>
@@ -4768,42 +5480,47 @@
             <p:ph type="title"/>
           </p:nvPr>
         </p:nvSpPr>
+        <p:spPr>
+          <a:xfrm>
+            <a:off x="1060147" y="2514600"/>
+            <a:ext cx="8692399" cy="2819400"/>
+          </a:xfrm>
+        </p:spPr>
+        <p:txBody>
+          <a:bodyPr/>
+          <a:lstStyle/>
+          <a:p>
+            <a:r>
+              <a:rPr lang="en-US" dirty="0" smtClean="0"/>
+              <a:t>Feature Engineering</a:t>
+            </a:r>
+            <a:endParaRPr lang="en-US" dirty="0"/>
+          </a:p>
+        </p:txBody>
+      </p:sp>
+      <p:sp>
+        <p:nvSpPr>
+          <p:cNvPr id="3" name="Text Placeholder 2"/>
+          <p:cNvSpPr>
+            <a:spLocks noGrp="1"/>
+          </p:cNvSpPr>
+          <p:nvPr>
+            <p:ph type="body" idx="1"/>
+          </p:nvPr>
+        </p:nvSpPr>
         <p:spPr/>
         <p:txBody>
           <a:bodyPr/>
           <a:lstStyle/>
           <a:p>
-            <a:r>
-              <a:rPr lang="en-US" dirty="0" smtClean="0"/>
-              <a:t>Exploratory Data Analysis</a:t>
-            </a:r>
             <a:endParaRPr lang="en-US" dirty="0"/>
-          </a:p>
-        </p:txBody>
-      </p:sp>
-      <p:sp>
-        <p:nvSpPr>
-          <p:cNvPr id="3" name="Text Placeholder 2"/>
-          <p:cNvSpPr>
-            <a:spLocks noGrp="1"/>
-          </p:cNvSpPr>
-          <p:nvPr>
-            <p:ph type="body" idx="1"/>
-          </p:nvPr>
-        </p:nvSpPr>
-        <p:spPr/>
-        <p:txBody>
-          <a:bodyPr/>
-          <a:lstStyle/>
-          <a:p>
-            <a:endParaRPr lang="en-US"/>
           </a:p>
         </p:txBody>
       </p:sp>
     </p:spTree>
     <p:extLst>
       <p:ext uri="{BB962C8B-B14F-4D97-AF65-F5344CB8AC3E}">
-        <p14:creationId xmlns:p14="http://schemas.microsoft.com/office/powerpoint/2010/main" val="1735722345"/>
+        <p14:creationId xmlns:p14="http://schemas.microsoft.com/office/powerpoint/2010/main" val="4269104972"/>
       </p:ext>
     </p:extLst>
   </p:cSld>
@@ -4852,11 +5569,20 @@
             <p:ph type="title"/>
           </p:nvPr>
         </p:nvSpPr>
-        <p:spPr/>
+        <p:spPr>
+          <a:xfrm>
+            <a:off x="1522413" y="381000"/>
+            <a:ext cx="9144001" cy="1143000"/>
+          </a:xfrm>
+        </p:spPr>
         <p:txBody>
           <a:bodyPr/>
           <a:lstStyle/>
           <a:p>
+            <a:r>
+              <a:rPr lang="en-US" dirty="0" smtClean="0"/>
+              <a:t>Features We Engineered: </a:t>
+            </a:r>
             <a:endParaRPr lang="en-US" dirty="0"/>
           </a:p>
         </p:txBody>
@@ -4883,7 +5609,7 @@
     </p:spTree>
     <p:extLst>
       <p:ext uri="{BB962C8B-B14F-4D97-AF65-F5344CB8AC3E}">
-        <p14:creationId xmlns:p14="http://schemas.microsoft.com/office/powerpoint/2010/main" val="3602508205"/>
+        <p14:creationId xmlns:p14="http://schemas.microsoft.com/office/powerpoint/2010/main" val="1691734402"/>
       </p:ext>
     </p:extLst>
   </p:cSld>

</xml_diff>

<commit_message>
just adding more to my sections
</commit_message>
<xml_diff>
--- a/Rossman Project.pptx
+++ b/Rossman Project.pptx
@@ -5,10 +5,10 @@
     <p:sldMasterId id="2147483648" r:id="rId2"/>
   </p:sldMasterIdLst>
   <p:notesMasterIdLst>
-    <p:notesMasterId r:id="rId19"/>
+    <p:notesMasterId r:id="rId20"/>
   </p:notesMasterIdLst>
   <p:handoutMasterIdLst>
-    <p:handoutMasterId r:id="rId20"/>
+    <p:handoutMasterId r:id="rId21"/>
   </p:handoutMasterIdLst>
   <p:sldIdLst>
     <p:sldId id="265" r:id="rId3"/>
@@ -26,12 +26,13 @@
     <p:sldId id="322" r:id="rId15"/>
     <p:sldId id="324" r:id="rId16"/>
     <p:sldId id="327" r:id="rId17"/>
-    <p:sldId id="331" r:id="rId18"/>
+    <p:sldId id="333" r:id="rId18"/>
+    <p:sldId id="331" r:id="rId19"/>
   </p:sldIdLst>
   <p:sldSz cx="12188825" cy="6858000"/>
   <p:notesSz cx="6858000" cy="9144000"/>
   <p:custDataLst>
-    <p:tags r:id="rId21"/>
+    <p:tags r:id="rId22"/>
   </p:custDataLst>
   <p:defaultTextStyle>
     <a:defPPr>
@@ -232,7 +233,7 @@
           <a:p>
             <a:fld id="{59088EAF-6ECA-4616-85EF-35AA19C641F3}" type="datetimeFigureOut">
               <a:rPr lang="en-US"/>
-              <a:t>2/17/2016</a:t>
+              <a:t>2/18/2016</a:t>
             </a:fld>
             <a:endParaRPr/>
           </a:p>
@@ -397,7 +398,7 @@
           <a:p>
             <a:fld id="{3ABD2D7A-D230-4F91-BD59-0A39C2703BA8}" type="datetimeFigureOut">
               <a:rPr lang="en-US"/>
-              <a:t>2/17/2016</a:t>
+              <a:t>2/18/2016</a:t>
             </a:fld>
             <a:endParaRPr/>
           </a:p>
@@ -664,6 +665,1434 @@
 </p:notesMaster>
 </file>
 
+<file path=ppt/notesSlides/notesSlide1.xml><?xml version="1.0" encoding="utf-8"?>
+<p:notes xmlns:a="http://schemas.openxmlformats.org/drawingml/2006/main" xmlns:r="http://schemas.openxmlformats.org/officeDocument/2006/relationships" xmlns:p="http://schemas.openxmlformats.org/presentationml/2006/main">
+  <p:cSld>
+    <p:spTree>
+      <p:nvGrpSpPr>
+        <p:cNvPr id="1" name=""/>
+        <p:cNvGrpSpPr/>
+        <p:nvPr/>
+      </p:nvGrpSpPr>
+      <p:grpSpPr>
+        <a:xfrm>
+          <a:off x="0" y="0"/>
+          <a:ext cx="0" cy="0"/>
+          <a:chOff x="0" y="0"/>
+          <a:chExt cx="0" cy="0"/>
+        </a:xfrm>
+      </p:grpSpPr>
+      <p:sp>
+        <p:nvSpPr>
+          <p:cNvPr id="2" name="Slide Image Placeholder 1"/>
+          <p:cNvSpPr>
+            <a:spLocks noGrp="1" noRot="1" noChangeAspect="1"/>
+          </p:cNvSpPr>
+          <p:nvPr>
+            <p:ph type="sldImg"/>
+          </p:nvPr>
+        </p:nvSpPr>
+        <p:spPr/>
+      </p:sp>
+      <p:sp>
+        <p:nvSpPr>
+          <p:cNvPr id="3" name="Notes Placeholder 2"/>
+          <p:cNvSpPr>
+            <a:spLocks noGrp="1"/>
+          </p:cNvSpPr>
+          <p:nvPr>
+            <p:ph type="body" idx="1"/>
+          </p:nvPr>
+        </p:nvSpPr>
+        <p:spPr/>
+        <p:txBody>
+          <a:bodyPr/>
+          <a:lstStyle/>
+          <a:p>
+            <a:endParaRPr lang="en-US"/>
+          </a:p>
+        </p:txBody>
+      </p:sp>
+      <p:sp>
+        <p:nvSpPr>
+          <p:cNvPr id="4" name="Slide Number Placeholder 3"/>
+          <p:cNvSpPr>
+            <a:spLocks noGrp="1"/>
+          </p:cNvSpPr>
+          <p:nvPr>
+            <p:ph type="sldNum" sz="quarter" idx="10"/>
+          </p:nvPr>
+        </p:nvSpPr>
+        <p:spPr/>
+        <p:txBody>
+          <a:bodyPr/>
+          <a:lstStyle/>
+          <a:p>
+            <a:fld id="{F93199CD-3E1B-4AE6-990F-76F925F5EA9F}" type="slidenum">
+              <a:rPr lang="en-US"/>
+              <a:t>1</a:t>
+            </a:fld>
+            <a:endParaRPr lang="en-US"/>
+          </a:p>
+        </p:txBody>
+      </p:sp>
+    </p:spTree>
+    <p:extLst>
+      <p:ext uri="{BB962C8B-B14F-4D97-AF65-F5344CB8AC3E}">
+        <p14:creationId xmlns:p14="http://schemas.microsoft.com/office/powerpoint/2010/main" val="2998607582"/>
+      </p:ext>
+    </p:extLst>
+  </p:cSld>
+  <p:clrMapOvr>
+    <a:masterClrMapping/>
+  </p:clrMapOvr>
+</p:notes>
+</file>
+
+<file path=ppt/notesSlides/notesSlide10.xml><?xml version="1.0" encoding="utf-8"?>
+<p:notes xmlns:a="http://schemas.openxmlformats.org/drawingml/2006/main" xmlns:r="http://schemas.openxmlformats.org/officeDocument/2006/relationships" xmlns:p="http://schemas.openxmlformats.org/presentationml/2006/main">
+  <p:cSld>
+    <p:spTree>
+      <p:nvGrpSpPr>
+        <p:cNvPr id="1" name=""/>
+        <p:cNvGrpSpPr/>
+        <p:nvPr/>
+      </p:nvGrpSpPr>
+      <p:grpSpPr>
+        <a:xfrm>
+          <a:off x="0" y="0"/>
+          <a:ext cx="0" cy="0"/>
+          <a:chOff x="0" y="0"/>
+          <a:chExt cx="0" cy="0"/>
+        </a:xfrm>
+      </p:grpSpPr>
+      <p:sp>
+        <p:nvSpPr>
+          <p:cNvPr id="2" name="Slide Image Placeholder 1"/>
+          <p:cNvSpPr>
+            <a:spLocks noGrp="1" noRot="1" noChangeAspect="1"/>
+          </p:cNvSpPr>
+          <p:nvPr>
+            <p:ph type="sldImg"/>
+          </p:nvPr>
+        </p:nvSpPr>
+        <p:spPr/>
+      </p:sp>
+      <p:sp>
+        <p:nvSpPr>
+          <p:cNvPr id="3" name="Notes Placeholder 2"/>
+          <p:cNvSpPr>
+            <a:spLocks noGrp="1"/>
+          </p:cNvSpPr>
+          <p:nvPr>
+            <p:ph type="body" idx="1"/>
+          </p:nvPr>
+        </p:nvSpPr>
+        <p:spPr/>
+        <p:txBody>
+          <a:bodyPr/>
+          <a:lstStyle/>
+          <a:p>
+            <a:endParaRPr lang="en-US"/>
+          </a:p>
+        </p:txBody>
+      </p:sp>
+      <p:sp>
+        <p:nvSpPr>
+          <p:cNvPr id="4" name="Slide Number Placeholder 3"/>
+          <p:cNvSpPr>
+            <a:spLocks noGrp="1"/>
+          </p:cNvSpPr>
+          <p:nvPr>
+            <p:ph type="sldNum" sz="quarter" idx="10"/>
+          </p:nvPr>
+        </p:nvSpPr>
+        <p:spPr/>
+        <p:txBody>
+          <a:bodyPr/>
+          <a:lstStyle/>
+          <a:p>
+            <a:fld id="{F93199CD-3E1B-4AE6-990F-76F925F5EA9F}" type="slidenum">
+              <a:rPr lang="en-US"/>
+              <a:t>10</a:t>
+            </a:fld>
+            <a:endParaRPr lang="en-US"/>
+          </a:p>
+        </p:txBody>
+      </p:sp>
+    </p:spTree>
+    <p:extLst>
+      <p:ext uri="{BB962C8B-B14F-4D97-AF65-F5344CB8AC3E}">
+        <p14:creationId xmlns:p14="http://schemas.microsoft.com/office/powerpoint/2010/main" val="3265472511"/>
+      </p:ext>
+    </p:extLst>
+  </p:cSld>
+  <p:clrMapOvr>
+    <a:masterClrMapping/>
+  </p:clrMapOvr>
+</p:notes>
+</file>
+
+<file path=ppt/notesSlides/notesSlide11.xml><?xml version="1.0" encoding="utf-8"?>
+<p:notes xmlns:a="http://schemas.openxmlformats.org/drawingml/2006/main" xmlns:r="http://schemas.openxmlformats.org/officeDocument/2006/relationships" xmlns:p="http://schemas.openxmlformats.org/presentationml/2006/main">
+  <p:cSld>
+    <p:spTree>
+      <p:nvGrpSpPr>
+        <p:cNvPr id="1" name=""/>
+        <p:cNvGrpSpPr/>
+        <p:nvPr/>
+      </p:nvGrpSpPr>
+      <p:grpSpPr>
+        <a:xfrm>
+          <a:off x="0" y="0"/>
+          <a:ext cx="0" cy="0"/>
+          <a:chOff x="0" y="0"/>
+          <a:chExt cx="0" cy="0"/>
+        </a:xfrm>
+      </p:grpSpPr>
+      <p:sp>
+        <p:nvSpPr>
+          <p:cNvPr id="2" name="Slide Image Placeholder 1"/>
+          <p:cNvSpPr>
+            <a:spLocks noGrp="1" noRot="1" noChangeAspect="1"/>
+          </p:cNvSpPr>
+          <p:nvPr>
+            <p:ph type="sldImg"/>
+          </p:nvPr>
+        </p:nvSpPr>
+        <p:spPr/>
+      </p:sp>
+      <p:sp>
+        <p:nvSpPr>
+          <p:cNvPr id="3" name="Notes Placeholder 2"/>
+          <p:cNvSpPr>
+            <a:spLocks noGrp="1"/>
+          </p:cNvSpPr>
+          <p:nvPr>
+            <p:ph type="body" idx="1"/>
+          </p:nvPr>
+        </p:nvSpPr>
+        <p:spPr/>
+        <p:txBody>
+          <a:bodyPr/>
+          <a:lstStyle/>
+          <a:p>
+            <a:endParaRPr lang="en-US"/>
+          </a:p>
+        </p:txBody>
+      </p:sp>
+      <p:sp>
+        <p:nvSpPr>
+          <p:cNvPr id="4" name="Slide Number Placeholder 3"/>
+          <p:cNvSpPr>
+            <a:spLocks noGrp="1"/>
+          </p:cNvSpPr>
+          <p:nvPr>
+            <p:ph type="sldNum" sz="quarter" idx="10"/>
+          </p:nvPr>
+        </p:nvSpPr>
+        <p:spPr/>
+        <p:txBody>
+          <a:bodyPr/>
+          <a:lstStyle/>
+          <a:p>
+            <a:fld id="{F93199CD-3E1B-4AE6-990F-76F925F5EA9F}" type="slidenum">
+              <a:rPr lang="en-US"/>
+              <a:t>11</a:t>
+            </a:fld>
+            <a:endParaRPr lang="en-US"/>
+          </a:p>
+        </p:txBody>
+      </p:sp>
+    </p:spTree>
+    <p:extLst>
+      <p:ext uri="{BB962C8B-B14F-4D97-AF65-F5344CB8AC3E}">
+        <p14:creationId xmlns:p14="http://schemas.microsoft.com/office/powerpoint/2010/main" val="398427964"/>
+      </p:ext>
+    </p:extLst>
+  </p:cSld>
+  <p:clrMapOvr>
+    <a:masterClrMapping/>
+  </p:clrMapOvr>
+</p:notes>
+</file>
+
+<file path=ppt/notesSlides/notesSlide12.xml><?xml version="1.0" encoding="utf-8"?>
+<p:notes xmlns:a="http://schemas.openxmlformats.org/drawingml/2006/main" xmlns:r="http://schemas.openxmlformats.org/officeDocument/2006/relationships" xmlns:p="http://schemas.openxmlformats.org/presentationml/2006/main">
+  <p:cSld>
+    <p:spTree>
+      <p:nvGrpSpPr>
+        <p:cNvPr id="1" name=""/>
+        <p:cNvGrpSpPr/>
+        <p:nvPr/>
+      </p:nvGrpSpPr>
+      <p:grpSpPr>
+        <a:xfrm>
+          <a:off x="0" y="0"/>
+          <a:ext cx="0" cy="0"/>
+          <a:chOff x="0" y="0"/>
+          <a:chExt cx="0" cy="0"/>
+        </a:xfrm>
+      </p:grpSpPr>
+      <p:sp>
+        <p:nvSpPr>
+          <p:cNvPr id="2" name="Slide Image Placeholder 1"/>
+          <p:cNvSpPr>
+            <a:spLocks noGrp="1" noRot="1" noChangeAspect="1"/>
+          </p:cNvSpPr>
+          <p:nvPr>
+            <p:ph type="sldImg"/>
+          </p:nvPr>
+        </p:nvSpPr>
+        <p:spPr/>
+      </p:sp>
+      <p:sp>
+        <p:nvSpPr>
+          <p:cNvPr id="3" name="Notes Placeholder 2"/>
+          <p:cNvSpPr>
+            <a:spLocks noGrp="1"/>
+          </p:cNvSpPr>
+          <p:nvPr>
+            <p:ph type="body" idx="1"/>
+          </p:nvPr>
+        </p:nvSpPr>
+        <p:spPr/>
+        <p:txBody>
+          <a:bodyPr/>
+          <a:lstStyle/>
+          <a:p>
+            <a:endParaRPr lang="en-US"/>
+          </a:p>
+        </p:txBody>
+      </p:sp>
+      <p:sp>
+        <p:nvSpPr>
+          <p:cNvPr id="4" name="Slide Number Placeholder 3"/>
+          <p:cNvSpPr>
+            <a:spLocks noGrp="1"/>
+          </p:cNvSpPr>
+          <p:nvPr>
+            <p:ph type="sldNum" sz="quarter" idx="10"/>
+          </p:nvPr>
+        </p:nvSpPr>
+        <p:spPr/>
+        <p:txBody>
+          <a:bodyPr/>
+          <a:lstStyle/>
+          <a:p>
+            <a:fld id="{F93199CD-3E1B-4AE6-990F-76F925F5EA9F}" type="slidenum">
+              <a:rPr lang="en-US"/>
+              <a:t>12</a:t>
+            </a:fld>
+            <a:endParaRPr lang="en-US"/>
+          </a:p>
+        </p:txBody>
+      </p:sp>
+    </p:spTree>
+    <p:extLst>
+      <p:ext uri="{BB962C8B-B14F-4D97-AF65-F5344CB8AC3E}">
+        <p14:creationId xmlns:p14="http://schemas.microsoft.com/office/powerpoint/2010/main" val="3465144915"/>
+      </p:ext>
+    </p:extLst>
+  </p:cSld>
+  <p:clrMapOvr>
+    <a:masterClrMapping/>
+  </p:clrMapOvr>
+</p:notes>
+</file>
+
+<file path=ppt/notesSlides/notesSlide13.xml><?xml version="1.0" encoding="utf-8"?>
+<p:notes xmlns:a="http://schemas.openxmlformats.org/drawingml/2006/main" xmlns:r="http://schemas.openxmlformats.org/officeDocument/2006/relationships" xmlns:p="http://schemas.openxmlformats.org/presentationml/2006/main">
+  <p:cSld>
+    <p:spTree>
+      <p:nvGrpSpPr>
+        <p:cNvPr id="1" name=""/>
+        <p:cNvGrpSpPr/>
+        <p:nvPr/>
+      </p:nvGrpSpPr>
+      <p:grpSpPr>
+        <a:xfrm>
+          <a:off x="0" y="0"/>
+          <a:ext cx="0" cy="0"/>
+          <a:chOff x="0" y="0"/>
+          <a:chExt cx="0" cy="0"/>
+        </a:xfrm>
+      </p:grpSpPr>
+      <p:sp>
+        <p:nvSpPr>
+          <p:cNvPr id="2" name="Slide Image Placeholder 1"/>
+          <p:cNvSpPr>
+            <a:spLocks noGrp="1" noRot="1" noChangeAspect="1"/>
+          </p:cNvSpPr>
+          <p:nvPr>
+            <p:ph type="sldImg"/>
+          </p:nvPr>
+        </p:nvSpPr>
+        <p:spPr/>
+      </p:sp>
+      <p:sp>
+        <p:nvSpPr>
+          <p:cNvPr id="3" name="Notes Placeholder 2"/>
+          <p:cNvSpPr>
+            <a:spLocks noGrp="1"/>
+          </p:cNvSpPr>
+          <p:nvPr>
+            <p:ph type="body" idx="1"/>
+          </p:nvPr>
+        </p:nvSpPr>
+        <p:spPr/>
+        <p:txBody>
+          <a:bodyPr/>
+          <a:lstStyle/>
+          <a:p>
+            <a:endParaRPr lang="en-US"/>
+          </a:p>
+        </p:txBody>
+      </p:sp>
+      <p:sp>
+        <p:nvSpPr>
+          <p:cNvPr id="4" name="Slide Number Placeholder 3"/>
+          <p:cNvSpPr>
+            <a:spLocks noGrp="1"/>
+          </p:cNvSpPr>
+          <p:nvPr>
+            <p:ph type="sldNum" sz="quarter" idx="10"/>
+          </p:nvPr>
+        </p:nvSpPr>
+        <p:spPr/>
+        <p:txBody>
+          <a:bodyPr/>
+          <a:lstStyle/>
+          <a:p>
+            <a:fld id="{F93199CD-3E1B-4AE6-990F-76F925F5EA9F}" type="slidenum">
+              <a:rPr lang="en-US"/>
+              <a:t>13</a:t>
+            </a:fld>
+            <a:endParaRPr lang="en-US"/>
+          </a:p>
+        </p:txBody>
+      </p:sp>
+    </p:spTree>
+    <p:extLst>
+      <p:ext uri="{BB962C8B-B14F-4D97-AF65-F5344CB8AC3E}">
+        <p14:creationId xmlns:p14="http://schemas.microsoft.com/office/powerpoint/2010/main" val="1906362612"/>
+      </p:ext>
+    </p:extLst>
+  </p:cSld>
+  <p:clrMapOvr>
+    <a:masterClrMapping/>
+  </p:clrMapOvr>
+</p:notes>
+</file>
+
+<file path=ppt/notesSlides/notesSlide14.xml><?xml version="1.0" encoding="utf-8"?>
+<p:notes xmlns:a="http://schemas.openxmlformats.org/drawingml/2006/main" xmlns:r="http://schemas.openxmlformats.org/officeDocument/2006/relationships" xmlns:p="http://schemas.openxmlformats.org/presentationml/2006/main">
+  <p:cSld>
+    <p:spTree>
+      <p:nvGrpSpPr>
+        <p:cNvPr id="1" name=""/>
+        <p:cNvGrpSpPr/>
+        <p:nvPr/>
+      </p:nvGrpSpPr>
+      <p:grpSpPr>
+        <a:xfrm>
+          <a:off x="0" y="0"/>
+          <a:ext cx="0" cy="0"/>
+          <a:chOff x="0" y="0"/>
+          <a:chExt cx="0" cy="0"/>
+        </a:xfrm>
+      </p:grpSpPr>
+      <p:sp>
+        <p:nvSpPr>
+          <p:cNvPr id="2" name="Slide Image Placeholder 1"/>
+          <p:cNvSpPr>
+            <a:spLocks noGrp="1" noRot="1" noChangeAspect="1"/>
+          </p:cNvSpPr>
+          <p:nvPr>
+            <p:ph type="sldImg"/>
+          </p:nvPr>
+        </p:nvSpPr>
+        <p:spPr/>
+      </p:sp>
+      <p:sp>
+        <p:nvSpPr>
+          <p:cNvPr id="3" name="Notes Placeholder 2"/>
+          <p:cNvSpPr>
+            <a:spLocks noGrp="1"/>
+          </p:cNvSpPr>
+          <p:nvPr>
+            <p:ph type="body" idx="1"/>
+          </p:nvPr>
+        </p:nvSpPr>
+        <p:spPr/>
+        <p:txBody>
+          <a:bodyPr/>
+          <a:lstStyle/>
+          <a:p>
+            <a:endParaRPr lang="en-US"/>
+          </a:p>
+        </p:txBody>
+      </p:sp>
+      <p:sp>
+        <p:nvSpPr>
+          <p:cNvPr id="4" name="Slide Number Placeholder 3"/>
+          <p:cNvSpPr>
+            <a:spLocks noGrp="1"/>
+          </p:cNvSpPr>
+          <p:nvPr>
+            <p:ph type="sldNum" sz="quarter" idx="10"/>
+          </p:nvPr>
+        </p:nvSpPr>
+        <p:spPr/>
+        <p:txBody>
+          <a:bodyPr/>
+          <a:lstStyle/>
+          <a:p>
+            <a:fld id="{F93199CD-3E1B-4AE6-990F-76F925F5EA9F}" type="slidenum">
+              <a:rPr lang="en-US"/>
+              <a:t>14</a:t>
+            </a:fld>
+            <a:endParaRPr lang="en-US"/>
+          </a:p>
+        </p:txBody>
+      </p:sp>
+    </p:spTree>
+    <p:extLst>
+      <p:ext uri="{BB962C8B-B14F-4D97-AF65-F5344CB8AC3E}">
+        <p14:creationId xmlns:p14="http://schemas.microsoft.com/office/powerpoint/2010/main" val="737999136"/>
+      </p:ext>
+    </p:extLst>
+  </p:cSld>
+  <p:clrMapOvr>
+    <a:masterClrMapping/>
+  </p:clrMapOvr>
+</p:notes>
+</file>
+
+<file path=ppt/notesSlides/notesSlide15.xml><?xml version="1.0" encoding="utf-8"?>
+<p:notes xmlns:a="http://schemas.openxmlformats.org/drawingml/2006/main" xmlns:r="http://schemas.openxmlformats.org/officeDocument/2006/relationships" xmlns:p="http://schemas.openxmlformats.org/presentationml/2006/main">
+  <p:cSld>
+    <p:spTree>
+      <p:nvGrpSpPr>
+        <p:cNvPr id="1" name=""/>
+        <p:cNvGrpSpPr/>
+        <p:nvPr/>
+      </p:nvGrpSpPr>
+      <p:grpSpPr>
+        <a:xfrm>
+          <a:off x="0" y="0"/>
+          <a:ext cx="0" cy="0"/>
+          <a:chOff x="0" y="0"/>
+          <a:chExt cx="0" cy="0"/>
+        </a:xfrm>
+      </p:grpSpPr>
+      <p:sp>
+        <p:nvSpPr>
+          <p:cNvPr id="2" name="Slide Image Placeholder 1"/>
+          <p:cNvSpPr>
+            <a:spLocks noGrp="1" noRot="1" noChangeAspect="1"/>
+          </p:cNvSpPr>
+          <p:nvPr>
+            <p:ph type="sldImg"/>
+          </p:nvPr>
+        </p:nvSpPr>
+        <p:spPr/>
+      </p:sp>
+      <p:sp>
+        <p:nvSpPr>
+          <p:cNvPr id="3" name="Notes Placeholder 2"/>
+          <p:cNvSpPr>
+            <a:spLocks noGrp="1"/>
+          </p:cNvSpPr>
+          <p:nvPr>
+            <p:ph type="body" idx="1"/>
+          </p:nvPr>
+        </p:nvSpPr>
+        <p:spPr/>
+        <p:txBody>
+          <a:bodyPr/>
+          <a:lstStyle/>
+          <a:p>
+            <a:endParaRPr lang="en-US"/>
+          </a:p>
+        </p:txBody>
+      </p:sp>
+      <p:sp>
+        <p:nvSpPr>
+          <p:cNvPr id="4" name="Slide Number Placeholder 3"/>
+          <p:cNvSpPr>
+            <a:spLocks noGrp="1"/>
+          </p:cNvSpPr>
+          <p:nvPr>
+            <p:ph type="sldNum" sz="quarter" idx="10"/>
+          </p:nvPr>
+        </p:nvSpPr>
+        <p:spPr/>
+        <p:txBody>
+          <a:bodyPr/>
+          <a:lstStyle/>
+          <a:p>
+            <a:fld id="{F93199CD-3E1B-4AE6-990F-76F925F5EA9F}" type="slidenum">
+              <a:rPr lang="en-US"/>
+              <a:t>15</a:t>
+            </a:fld>
+            <a:endParaRPr lang="en-US"/>
+          </a:p>
+        </p:txBody>
+      </p:sp>
+    </p:spTree>
+    <p:extLst>
+      <p:ext uri="{BB962C8B-B14F-4D97-AF65-F5344CB8AC3E}">
+        <p14:creationId xmlns:p14="http://schemas.microsoft.com/office/powerpoint/2010/main" val="3755514676"/>
+      </p:ext>
+    </p:extLst>
+  </p:cSld>
+  <p:clrMapOvr>
+    <a:masterClrMapping/>
+  </p:clrMapOvr>
+</p:notes>
+</file>
+
+<file path=ppt/notesSlides/notesSlide16.xml><?xml version="1.0" encoding="utf-8"?>
+<p:notes xmlns:a="http://schemas.openxmlformats.org/drawingml/2006/main" xmlns:r="http://schemas.openxmlformats.org/officeDocument/2006/relationships" xmlns:p="http://schemas.openxmlformats.org/presentationml/2006/main">
+  <p:cSld>
+    <p:spTree>
+      <p:nvGrpSpPr>
+        <p:cNvPr id="1" name=""/>
+        <p:cNvGrpSpPr/>
+        <p:nvPr/>
+      </p:nvGrpSpPr>
+      <p:grpSpPr>
+        <a:xfrm>
+          <a:off x="0" y="0"/>
+          <a:ext cx="0" cy="0"/>
+          <a:chOff x="0" y="0"/>
+          <a:chExt cx="0" cy="0"/>
+        </a:xfrm>
+      </p:grpSpPr>
+      <p:sp>
+        <p:nvSpPr>
+          <p:cNvPr id="2" name="Slide Image Placeholder 1"/>
+          <p:cNvSpPr>
+            <a:spLocks noGrp="1" noRot="1" noChangeAspect="1"/>
+          </p:cNvSpPr>
+          <p:nvPr>
+            <p:ph type="sldImg"/>
+          </p:nvPr>
+        </p:nvSpPr>
+        <p:spPr/>
+      </p:sp>
+      <p:sp>
+        <p:nvSpPr>
+          <p:cNvPr id="3" name="Notes Placeholder 2"/>
+          <p:cNvSpPr>
+            <a:spLocks noGrp="1"/>
+          </p:cNvSpPr>
+          <p:nvPr>
+            <p:ph type="body" idx="1"/>
+          </p:nvPr>
+        </p:nvSpPr>
+        <p:spPr/>
+        <p:txBody>
+          <a:bodyPr/>
+          <a:lstStyle/>
+          <a:p>
+            <a:endParaRPr lang="en-US"/>
+          </a:p>
+        </p:txBody>
+      </p:sp>
+      <p:sp>
+        <p:nvSpPr>
+          <p:cNvPr id="4" name="Slide Number Placeholder 3"/>
+          <p:cNvSpPr>
+            <a:spLocks noGrp="1"/>
+          </p:cNvSpPr>
+          <p:nvPr>
+            <p:ph type="sldNum" sz="quarter" idx="10"/>
+          </p:nvPr>
+        </p:nvSpPr>
+        <p:spPr/>
+        <p:txBody>
+          <a:bodyPr/>
+          <a:lstStyle/>
+          <a:p>
+            <a:fld id="{F93199CD-3E1B-4AE6-990F-76F925F5EA9F}" type="slidenum">
+              <a:rPr lang="en-US"/>
+              <a:t>16</a:t>
+            </a:fld>
+            <a:endParaRPr lang="en-US"/>
+          </a:p>
+        </p:txBody>
+      </p:sp>
+    </p:spTree>
+    <p:extLst>
+      <p:ext uri="{BB962C8B-B14F-4D97-AF65-F5344CB8AC3E}">
+        <p14:creationId xmlns:p14="http://schemas.microsoft.com/office/powerpoint/2010/main" val="3580212204"/>
+      </p:ext>
+    </p:extLst>
+  </p:cSld>
+  <p:clrMapOvr>
+    <a:masterClrMapping/>
+  </p:clrMapOvr>
+</p:notes>
+</file>
+
+<file path=ppt/notesSlides/notesSlide17.xml><?xml version="1.0" encoding="utf-8"?>
+<p:notes xmlns:a="http://schemas.openxmlformats.org/drawingml/2006/main" xmlns:r="http://schemas.openxmlformats.org/officeDocument/2006/relationships" xmlns:p="http://schemas.openxmlformats.org/presentationml/2006/main">
+  <p:cSld>
+    <p:spTree>
+      <p:nvGrpSpPr>
+        <p:cNvPr id="1" name=""/>
+        <p:cNvGrpSpPr/>
+        <p:nvPr/>
+      </p:nvGrpSpPr>
+      <p:grpSpPr>
+        <a:xfrm>
+          <a:off x="0" y="0"/>
+          <a:ext cx="0" cy="0"/>
+          <a:chOff x="0" y="0"/>
+          <a:chExt cx="0" cy="0"/>
+        </a:xfrm>
+      </p:grpSpPr>
+      <p:sp>
+        <p:nvSpPr>
+          <p:cNvPr id="2" name="Slide Image Placeholder 1"/>
+          <p:cNvSpPr>
+            <a:spLocks noGrp="1" noRot="1" noChangeAspect="1"/>
+          </p:cNvSpPr>
+          <p:nvPr>
+            <p:ph type="sldImg"/>
+          </p:nvPr>
+        </p:nvSpPr>
+        <p:spPr/>
+      </p:sp>
+      <p:sp>
+        <p:nvSpPr>
+          <p:cNvPr id="3" name="Notes Placeholder 2"/>
+          <p:cNvSpPr>
+            <a:spLocks noGrp="1"/>
+          </p:cNvSpPr>
+          <p:nvPr>
+            <p:ph type="body" idx="1"/>
+          </p:nvPr>
+        </p:nvSpPr>
+        <p:spPr/>
+        <p:txBody>
+          <a:bodyPr/>
+          <a:lstStyle/>
+          <a:p>
+            <a:endParaRPr lang="en-US"/>
+          </a:p>
+        </p:txBody>
+      </p:sp>
+      <p:sp>
+        <p:nvSpPr>
+          <p:cNvPr id="4" name="Slide Number Placeholder 3"/>
+          <p:cNvSpPr>
+            <a:spLocks noGrp="1"/>
+          </p:cNvSpPr>
+          <p:nvPr>
+            <p:ph type="sldNum" sz="quarter" idx="10"/>
+          </p:nvPr>
+        </p:nvSpPr>
+        <p:spPr/>
+        <p:txBody>
+          <a:bodyPr/>
+          <a:lstStyle/>
+          <a:p>
+            <a:fld id="{F93199CD-3E1B-4AE6-990F-76F925F5EA9F}" type="slidenum">
+              <a:rPr lang="en-US"/>
+              <a:t>17</a:t>
+            </a:fld>
+            <a:endParaRPr lang="en-US"/>
+          </a:p>
+        </p:txBody>
+      </p:sp>
+    </p:spTree>
+    <p:extLst>
+      <p:ext uri="{BB962C8B-B14F-4D97-AF65-F5344CB8AC3E}">
+        <p14:creationId xmlns:p14="http://schemas.microsoft.com/office/powerpoint/2010/main" val="27146572"/>
+      </p:ext>
+    </p:extLst>
+  </p:cSld>
+  <p:clrMapOvr>
+    <a:masterClrMapping/>
+  </p:clrMapOvr>
+</p:notes>
+</file>
+
+<file path=ppt/notesSlides/notesSlide2.xml><?xml version="1.0" encoding="utf-8"?>
+<p:notes xmlns:a="http://schemas.openxmlformats.org/drawingml/2006/main" xmlns:r="http://schemas.openxmlformats.org/officeDocument/2006/relationships" xmlns:p="http://schemas.openxmlformats.org/presentationml/2006/main">
+  <p:cSld>
+    <p:spTree>
+      <p:nvGrpSpPr>
+        <p:cNvPr id="1" name=""/>
+        <p:cNvGrpSpPr/>
+        <p:nvPr/>
+      </p:nvGrpSpPr>
+      <p:grpSpPr>
+        <a:xfrm>
+          <a:off x="0" y="0"/>
+          <a:ext cx="0" cy="0"/>
+          <a:chOff x="0" y="0"/>
+          <a:chExt cx="0" cy="0"/>
+        </a:xfrm>
+      </p:grpSpPr>
+      <p:sp>
+        <p:nvSpPr>
+          <p:cNvPr id="2" name="Slide Image Placeholder 1"/>
+          <p:cNvSpPr>
+            <a:spLocks noGrp="1" noRot="1" noChangeAspect="1"/>
+          </p:cNvSpPr>
+          <p:nvPr>
+            <p:ph type="sldImg"/>
+          </p:nvPr>
+        </p:nvSpPr>
+        <p:spPr/>
+      </p:sp>
+      <p:sp>
+        <p:nvSpPr>
+          <p:cNvPr id="3" name="Notes Placeholder 2"/>
+          <p:cNvSpPr>
+            <a:spLocks noGrp="1"/>
+          </p:cNvSpPr>
+          <p:nvPr>
+            <p:ph type="body" idx="1"/>
+          </p:nvPr>
+        </p:nvSpPr>
+        <p:spPr/>
+        <p:txBody>
+          <a:bodyPr/>
+          <a:lstStyle/>
+          <a:p>
+            <a:endParaRPr lang="en-US"/>
+          </a:p>
+        </p:txBody>
+      </p:sp>
+      <p:sp>
+        <p:nvSpPr>
+          <p:cNvPr id="4" name="Slide Number Placeholder 3"/>
+          <p:cNvSpPr>
+            <a:spLocks noGrp="1"/>
+          </p:cNvSpPr>
+          <p:nvPr>
+            <p:ph type="sldNum" sz="quarter" idx="10"/>
+          </p:nvPr>
+        </p:nvSpPr>
+        <p:spPr/>
+        <p:txBody>
+          <a:bodyPr/>
+          <a:lstStyle/>
+          <a:p>
+            <a:fld id="{F93199CD-3E1B-4AE6-990F-76F925F5EA9F}" type="slidenum">
+              <a:rPr lang="en-US"/>
+              <a:t>2</a:t>
+            </a:fld>
+            <a:endParaRPr lang="en-US"/>
+          </a:p>
+        </p:txBody>
+      </p:sp>
+    </p:spTree>
+    <p:extLst>
+      <p:ext uri="{BB962C8B-B14F-4D97-AF65-F5344CB8AC3E}">
+        <p14:creationId xmlns:p14="http://schemas.microsoft.com/office/powerpoint/2010/main" val="1528466190"/>
+      </p:ext>
+    </p:extLst>
+  </p:cSld>
+  <p:clrMapOvr>
+    <a:masterClrMapping/>
+  </p:clrMapOvr>
+</p:notes>
+</file>
+
+<file path=ppt/notesSlides/notesSlide3.xml><?xml version="1.0" encoding="utf-8"?>
+<p:notes xmlns:a="http://schemas.openxmlformats.org/drawingml/2006/main" xmlns:r="http://schemas.openxmlformats.org/officeDocument/2006/relationships" xmlns:p="http://schemas.openxmlformats.org/presentationml/2006/main">
+  <p:cSld>
+    <p:spTree>
+      <p:nvGrpSpPr>
+        <p:cNvPr id="1" name=""/>
+        <p:cNvGrpSpPr/>
+        <p:nvPr/>
+      </p:nvGrpSpPr>
+      <p:grpSpPr>
+        <a:xfrm>
+          <a:off x="0" y="0"/>
+          <a:ext cx="0" cy="0"/>
+          <a:chOff x="0" y="0"/>
+          <a:chExt cx="0" cy="0"/>
+        </a:xfrm>
+      </p:grpSpPr>
+      <p:sp>
+        <p:nvSpPr>
+          <p:cNvPr id="2" name="Slide Image Placeholder 1"/>
+          <p:cNvSpPr>
+            <a:spLocks noGrp="1" noRot="1" noChangeAspect="1"/>
+          </p:cNvSpPr>
+          <p:nvPr>
+            <p:ph type="sldImg"/>
+          </p:nvPr>
+        </p:nvSpPr>
+        <p:spPr/>
+      </p:sp>
+      <p:sp>
+        <p:nvSpPr>
+          <p:cNvPr id="3" name="Notes Placeholder 2"/>
+          <p:cNvSpPr>
+            <a:spLocks noGrp="1"/>
+          </p:cNvSpPr>
+          <p:nvPr>
+            <p:ph type="body" idx="1"/>
+          </p:nvPr>
+        </p:nvSpPr>
+        <p:spPr/>
+        <p:txBody>
+          <a:bodyPr/>
+          <a:lstStyle/>
+          <a:p>
+            <a:endParaRPr lang="en-US"/>
+          </a:p>
+        </p:txBody>
+      </p:sp>
+      <p:sp>
+        <p:nvSpPr>
+          <p:cNvPr id="4" name="Slide Number Placeholder 3"/>
+          <p:cNvSpPr>
+            <a:spLocks noGrp="1"/>
+          </p:cNvSpPr>
+          <p:nvPr>
+            <p:ph type="sldNum" sz="quarter" idx="10"/>
+          </p:nvPr>
+        </p:nvSpPr>
+        <p:spPr/>
+        <p:txBody>
+          <a:bodyPr/>
+          <a:lstStyle/>
+          <a:p>
+            <a:fld id="{F93199CD-3E1B-4AE6-990F-76F925F5EA9F}" type="slidenum">
+              <a:rPr lang="en-US"/>
+              <a:t>3</a:t>
+            </a:fld>
+            <a:endParaRPr lang="en-US"/>
+          </a:p>
+        </p:txBody>
+      </p:sp>
+    </p:spTree>
+    <p:extLst>
+      <p:ext uri="{BB962C8B-B14F-4D97-AF65-F5344CB8AC3E}">
+        <p14:creationId xmlns:p14="http://schemas.microsoft.com/office/powerpoint/2010/main" val="4198929282"/>
+      </p:ext>
+    </p:extLst>
+  </p:cSld>
+  <p:clrMapOvr>
+    <a:masterClrMapping/>
+  </p:clrMapOvr>
+</p:notes>
+</file>
+
+<file path=ppt/notesSlides/notesSlide4.xml><?xml version="1.0" encoding="utf-8"?>
+<p:notes xmlns:a="http://schemas.openxmlformats.org/drawingml/2006/main" xmlns:r="http://schemas.openxmlformats.org/officeDocument/2006/relationships" xmlns:p="http://schemas.openxmlformats.org/presentationml/2006/main">
+  <p:cSld>
+    <p:spTree>
+      <p:nvGrpSpPr>
+        <p:cNvPr id="1" name=""/>
+        <p:cNvGrpSpPr/>
+        <p:nvPr/>
+      </p:nvGrpSpPr>
+      <p:grpSpPr>
+        <a:xfrm>
+          <a:off x="0" y="0"/>
+          <a:ext cx="0" cy="0"/>
+          <a:chOff x="0" y="0"/>
+          <a:chExt cx="0" cy="0"/>
+        </a:xfrm>
+      </p:grpSpPr>
+      <p:sp>
+        <p:nvSpPr>
+          <p:cNvPr id="2" name="Slide Image Placeholder 1"/>
+          <p:cNvSpPr>
+            <a:spLocks noGrp="1" noRot="1" noChangeAspect="1"/>
+          </p:cNvSpPr>
+          <p:nvPr>
+            <p:ph type="sldImg"/>
+          </p:nvPr>
+        </p:nvSpPr>
+        <p:spPr/>
+      </p:sp>
+      <p:sp>
+        <p:nvSpPr>
+          <p:cNvPr id="3" name="Notes Placeholder 2"/>
+          <p:cNvSpPr>
+            <a:spLocks noGrp="1"/>
+          </p:cNvSpPr>
+          <p:nvPr>
+            <p:ph type="body" idx="1"/>
+          </p:nvPr>
+        </p:nvSpPr>
+        <p:spPr/>
+        <p:txBody>
+          <a:bodyPr/>
+          <a:lstStyle/>
+          <a:p>
+            <a:endParaRPr lang="en-US"/>
+          </a:p>
+        </p:txBody>
+      </p:sp>
+      <p:sp>
+        <p:nvSpPr>
+          <p:cNvPr id="4" name="Slide Number Placeholder 3"/>
+          <p:cNvSpPr>
+            <a:spLocks noGrp="1"/>
+          </p:cNvSpPr>
+          <p:nvPr>
+            <p:ph type="sldNum" sz="quarter" idx="10"/>
+          </p:nvPr>
+        </p:nvSpPr>
+        <p:spPr/>
+        <p:txBody>
+          <a:bodyPr/>
+          <a:lstStyle/>
+          <a:p>
+            <a:fld id="{F93199CD-3E1B-4AE6-990F-76F925F5EA9F}" type="slidenum">
+              <a:rPr lang="en-US"/>
+              <a:t>4</a:t>
+            </a:fld>
+            <a:endParaRPr lang="en-US"/>
+          </a:p>
+        </p:txBody>
+      </p:sp>
+    </p:spTree>
+    <p:extLst>
+      <p:ext uri="{BB962C8B-B14F-4D97-AF65-F5344CB8AC3E}">
+        <p14:creationId xmlns:p14="http://schemas.microsoft.com/office/powerpoint/2010/main" val="2518576796"/>
+      </p:ext>
+    </p:extLst>
+  </p:cSld>
+  <p:clrMapOvr>
+    <a:masterClrMapping/>
+  </p:clrMapOvr>
+</p:notes>
+</file>
+
+<file path=ppt/notesSlides/notesSlide5.xml><?xml version="1.0" encoding="utf-8"?>
+<p:notes xmlns:a="http://schemas.openxmlformats.org/drawingml/2006/main" xmlns:r="http://schemas.openxmlformats.org/officeDocument/2006/relationships" xmlns:p="http://schemas.openxmlformats.org/presentationml/2006/main">
+  <p:cSld>
+    <p:spTree>
+      <p:nvGrpSpPr>
+        <p:cNvPr id="1" name=""/>
+        <p:cNvGrpSpPr/>
+        <p:nvPr/>
+      </p:nvGrpSpPr>
+      <p:grpSpPr>
+        <a:xfrm>
+          <a:off x="0" y="0"/>
+          <a:ext cx="0" cy="0"/>
+          <a:chOff x="0" y="0"/>
+          <a:chExt cx="0" cy="0"/>
+        </a:xfrm>
+      </p:grpSpPr>
+      <p:sp>
+        <p:nvSpPr>
+          <p:cNvPr id="2" name="Slide Image Placeholder 1"/>
+          <p:cNvSpPr>
+            <a:spLocks noGrp="1" noRot="1" noChangeAspect="1"/>
+          </p:cNvSpPr>
+          <p:nvPr>
+            <p:ph type="sldImg"/>
+          </p:nvPr>
+        </p:nvSpPr>
+        <p:spPr/>
+      </p:sp>
+      <p:sp>
+        <p:nvSpPr>
+          <p:cNvPr id="3" name="Notes Placeholder 2"/>
+          <p:cNvSpPr>
+            <a:spLocks noGrp="1"/>
+          </p:cNvSpPr>
+          <p:nvPr>
+            <p:ph type="body" idx="1"/>
+          </p:nvPr>
+        </p:nvSpPr>
+        <p:spPr/>
+        <p:txBody>
+          <a:bodyPr/>
+          <a:lstStyle/>
+          <a:p>
+            <a:endParaRPr lang="en-US"/>
+          </a:p>
+        </p:txBody>
+      </p:sp>
+      <p:sp>
+        <p:nvSpPr>
+          <p:cNvPr id="4" name="Slide Number Placeholder 3"/>
+          <p:cNvSpPr>
+            <a:spLocks noGrp="1"/>
+          </p:cNvSpPr>
+          <p:nvPr>
+            <p:ph type="sldNum" sz="quarter" idx="10"/>
+          </p:nvPr>
+        </p:nvSpPr>
+        <p:spPr/>
+        <p:txBody>
+          <a:bodyPr/>
+          <a:lstStyle/>
+          <a:p>
+            <a:fld id="{F93199CD-3E1B-4AE6-990F-76F925F5EA9F}" type="slidenum">
+              <a:rPr lang="en-US"/>
+              <a:t>5</a:t>
+            </a:fld>
+            <a:endParaRPr lang="en-US"/>
+          </a:p>
+        </p:txBody>
+      </p:sp>
+    </p:spTree>
+    <p:extLst>
+      <p:ext uri="{BB962C8B-B14F-4D97-AF65-F5344CB8AC3E}">
+        <p14:creationId xmlns:p14="http://schemas.microsoft.com/office/powerpoint/2010/main" val="2206339867"/>
+      </p:ext>
+    </p:extLst>
+  </p:cSld>
+  <p:clrMapOvr>
+    <a:masterClrMapping/>
+  </p:clrMapOvr>
+</p:notes>
+</file>
+
+<file path=ppt/notesSlides/notesSlide6.xml><?xml version="1.0" encoding="utf-8"?>
+<p:notes xmlns:a="http://schemas.openxmlformats.org/drawingml/2006/main" xmlns:r="http://schemas.openxmlformats.org/officeDocument/2006/relationships" xmlns:p="http://schemas.openxmlformats.org/presentationml/2006/main">
+  <p:cSld>
+    <p:spTree>
+      <p:nvGrpSpPr>
+        <p:cNvPr id="1" name=""/>
+        <p:cNvGrpSpPr/>
+        <p:nvPr/>
+      </p:nvGrpSpPr>
+      <p:grpSpPr>
+        <a:xfrm>
+          <a:off x="0" y="0"/>
+          <a:ext cx="0" cy="0"/>
+          <a:chOff x="0" y="0"/>
+          <a:chExt cx="0" cy="0"/>
+        </a:xfrm>
+      </p:grpSpPr>
+      <p:sp>
+        <p:nvSpPr>
+          <p:cNvPr id="2" name="Slide Image Placeholder 1"/>
+          <p:cNvSpPr>
+            <a:spLocks noGrp="1" noRot="1" noChangeAspect="1"/>
+          </p:cNvSpPr>
+          <p:nvPr>
+            <p:ph type="sldImg"/>
+          </p:nvPr>
+        </p:nvSpPr>
+        <p:spPr/>
+      </p:sp>
+      <p:sp>
+        <p:nvSpPr>
+          <p:cNvPr id="3" name="Notes Placeholder 2"/>
+          <p:cNvSpPr>
+            <a:spLocks noGrp="1"/>
+          </p:cNvSpPr>
+          <p:nvPr>
+            <p:ph type="body" idx="1"/>
+          </p:nvPr>
+        </p:nvSpPr>
+        <p:spPr/>
+        <p:txBody>
+          <a:bodyPr/>
+          <a:lstStyle/>
+          <a:p>
+            <a:endParaRPr lang="en-US"/>
+          </a:p>
+        </p:txBody>
+      </p:sp>
+      <p:sp>
+        <p:nvSpPr>
+          <p:cNvPr id="4" name="Slide Number Placeholder 3"/>
+          <p:cNvSpPr>
+            <a:spLocks noGrp="1"/>
+          </p:cNvSpPr>
+          <p:nvPr>
+            <p:ph type="sldNum" sz="quarter" idx="10"/>
+          </p:nvPr>
+        </p:nvSpPr>
+        <p:spPr/>
+        <p:txBody>
+          <a:bodyPr/>
+          <a:lstStyle/>
+          <a:p>
+            <a:fld id="{F93199CD-3E1B-4AE6-990F-76F925F5EA9F}" type="slidenum">
+              <a:rPr lang="en-US"/>
+              <a:t>6</a:t>
+            </a:fld>
+            <a:endParaRPr lang="en-US"/>
+          </a:p>
+        </p:txBody>
+      </p:sp>
+    </p:spTree>
+    <p:extLst>
+      <p:ext uri="{BB962C8B-B14F-4D97-AF65-F5344CB8AC3E}">
+        <p14:creationId xmlns:p14="http://schemas.microsoft.com/office/powerpoint/2010/main" val="3103062848"/>
+      </p:ext>
+    </p:extLst>
+  </p:cSld>
+  <p:clrMapOvr>
+    <a:masterClrMapping/>
+  </p:clrMapOvr>
+</p:notes>
+</file>
+
+<file path=ppt/notesSlides/notesSlide7.xml><?xml version="1.0" encoding="utf-8"?>
+<p:notes xmlns:a="http://schemas.openxmlformats.org/drawingml/2006/main" xmlns:r="http://schemas.openxmlformats.org/officeDocument/2006/relationships" xmlns:p="http://schemas.openxmlformats.org/presentationml/2006/main">
+  <p:cSld>
+    <p:spTree>
+      <p:nvGrpSpPr>
+        <p:cNvPr id="1" name=""/>
+        <p:cNvGrpSpPr/>
+        <p:nvPr/>
+      </p:nvGrpSpPr>
+      <p:grpSpPr>
+        <a:xfrm>
+          <a:off x="0" y="0"/>
+          <a:ext cx="0" cy="0"/>
+          <a:chOff x="0" y="0"/>
+          <a:chExt cx="0" cy="0"/>
+        </a:xfrm>
+      </p:grpSpPr>
+      <p:sp>
+        <p:nvSpPr>
+          <p:cNvPr id="2" name="Slide Image Placeholder 1"/>
+          <p:cNvSpPr>
+            <a:spLocks noGrp="1" noRot="1" noChangeAspect="1"/>
+          </p:cNvSpPr>
+          <p:nvPr>
+            <p:ph type="sldImg"/>
+          </p:nvPr>
+        </p:nvSpPr>
+        <p:spPr/>
+      </p:sp>
+      <p:sp>
+        <p:nvSpPr>
+          <p:cNvPr id="3" name="Notes Placeholder 2"/>
+          <p:cNvSpPr>
+            <a:spLocks noGrp="1"/>
+          </p:cNvSpPr>
+          <p:nvPr>
+            <p:ph type="body" idx="1"/>
+          </p:nvPr>
+        </p:nvSpPr>
+        <p:spPr/>
+        <p:txBody>
+          <a:bodyPr/>
+          <a:lstStyle/>
+          <a:p>
+            <a:endParaRPr lang="en-US"/>
+          </a:p>
+        </p:txBody>
+      </p:sp>
+      <p:sp>
+        <p:nvSpPr>
+          <p:cNvPr id="4" name="Slide Number Placeholder 3"/>
+          <p:cNvSpPr>
+            <a:spLocks noGrp="1"/>
+          </p:cNvSpPr>
+          <p:nvPr>
+            <p:ph type="sldNum" sz="quarter" idx="10"/>
+          </p:nvPr>
+        </p:nvSpPr>
+        <p:spPr/>
+        <p:txBody>
+          <a:bodyPr/>
+          <a:lstStyle/>
+          <a:p>
+            <a:fld id="{F93199CD-3E1B-4AE6-990F-76F925F5EA9F}" type="slidenum">
+              <a:rPr lang="en-US"/>
+              <a:t>7</a:t>
+            </a:fld>
+            <a:endParaRPr lang="en-US"/>
+          </a:p>
+        </p:txBody>
+      </p:sp>
+    </p:spTree>
+    <p:extLst>
+      <p:ext uri="{BB962C8B-B14F-4D97-AF65-F5344CB8AC3E}">
+        <p14:creationId xmlns:p14="http://schemas.microsoft.com/office/powerpoint/2010/main" val="4137474754"/>
+      </p:ext>
+    </p:extLst>
+  </p:cSld>
+  <p:clrMapOvr>
+    <a:masterClrMapping/>
+  </p:clrMapOvr>
+</p:notes>
+</file>
+
+<file path=ppt/notesSlides/notesSlide8.xml><?xml version="1.0" encoding="utf-8"?>
+<p:notes xmlns:a="http://schemas.openxmlformats.org/drawingml/2006/main" xmlns:r="http://schemas.openxmlformats.org/officeDocument/2006/relationships" xmlns:p="http://schemas.openxmlformats.org/presentationml/2006/main">
+  <p:cSld>
+    <p:spTree>
+      <p:nvGrpSpPr>
+        <p:cNvPr id="1" name=""/>
+        <p:cNvGrpSpPr/>
+        <p:nvPr/>
+      </p:nvGrpSpPr>
+      <p:grpSpPr>
+        <a:xfrm>
+          <a:off x="0" y="0"/>
+          <a:ext cx="0" cy="0"/>
+          <a:chOff x="0" y="0"/>
+          <a:chExt cx="0" cy="0"/>
+        </a:xfrm>
+      </p:grpSpPr>
+      <p:sp>
+        <p:nvSpPr>
+          <p:cNvPr id="2" name="Slide Image Placeholder 1"/>
+          <p:cNvSpPr>
+            <a:spLocks noGrp="1" noRot="1" noChangeAspect="1"/>
+          </p:cNvSpPr>
+          <p:nvPr>
+            <p:ph type="sldImg"/>
+          </p:nvPr>
+        </p:nvSpPr>
+        <p:spPr/>
+      </p:sp>
+      <p:sp>
+        <p:nvSpPr>
+          <p:cNvPr id="3" name="Notes Placeholder 2"/>
+          <p:cNvSpPr>
+            <a:spLocks noGrp="1"/>
+          </p:cNvSpPr>
+          <p:nvPr>
+            <p:ph type="body" idx="1"/>
+          </p:nvPr>
+        </p:nvSpPr>
+        <p:spPr/>
+        <p:txBody>
+          <a:bodyPr/>
+          <a:lstStyle/>
+          <a:p>
+            <a:endParaRPr lang="en-US"/>
+          </a:p>
+        </p:txBody>
+      </p:sp>
+      <p:sp>
+        <p:nvSpPr>
+          <p:cNvPr id="4" name="Slide Number Placeholder 3"/>
+          <p:cNvSpPr>
+            <a:spLocks noGrp="1"/>
+          </p:cNvSpPr>
+          <p:nvPr>
+            <p:ph type="sldNum" sz="quarter" idx="10"/>
+          </p:nvPr>
+        </p:nvSpPr>
+        <p:spPr/>
+        <p:txBody>
+          <a:bodyPr/>
+          <a:lstStyle/>
+          <a:p>
+            <a:fld id="{F93199CD-3E1B-4AE6-990F-76F925F5EA9F}" type="slidenum">
+              <a:rPr lang="en-US"/>
+              <a:t>8</a:t>
+            </a:fld>
+            <a:endParaRPr lang="en-US"/>
+          </a:p>
+        </p:txBody>
+      </p:sp>
+    </p:spTree>
+    <p:extLst>
+      <p:ext uri="{BB962C8B-B14F-4D97-AF65-F5344CB8AC3E}">
+        <p14:creationId xmlns:p14="http://schemas.microsoft.com/office/powerpoint/2010/main" val="273811965"/>
+      </p:ext>
+    </p:extLst>
+  </p:cSld>
+  <p:clrMapOvr>
+    <a:masterClrMapping/>
+  </p:clrMapOvr>
+</p:notes>
+</file>
+
+<file path=ppt/notesSlides/notesSlide9.xml><?xml version="1.0" encoding="utf-8"?>
+<p:notes xmlns:a="http://schemas.openxmlformats.org/drawingml/2006/main" xmlns:r="http://schemas.openxmlformats.org/officeDocument/2006/relationships" xmlns:p="http://schemas.openxmlformats.org/presentationml/2006/main">
+  <p:cSld>
+    <p:spTree>
+      <p:nvGrpSpPr>
+        <p:cNvPr id="1" name=""/>
+        <p:cNvGrpSpPr/>
+        <p:nvPr/>
+      </p:nvGrpSpPr>
+      <p:grpSpPr>
+        <a:xfrm>
+          <a:off x="0" y="0"/>
+          <a:ext cx="0" cy="0"/>
+          <a:chOff x="0" y="0"/>
+          <a:chExt cx="0" cy="0"/>
+        </a:xfrm>
+      </p:grpSpPr>
+      <p:sp>
+        <p:nvSpPr>
+          <p:cNvPr id="2" name="Slide Image Placeholder 1"/>
+          <p:cNvSpPr>
+            <a:spLocks noGrp="1" noRot="1" noChangeAspect="1"/>
+          </p:cNvSpPr>
+          <p:nvPr>
+            <p:ph type="sldImg"/>
+          </p:nvPr>
+        </p:nvSpPr>
+        <p:spPr/>
+      </p:sp>
+      <p:sp>
+        <p:nvSpPr>
+          <p:cNvPr id="3" name="Notes Placeholder 2"/>
+          <p:cNvSpPr>
+            <a:spLocks noGrp="1"/>
+          </p:cNvSpPr>
+          <p:nvPr>
+            <p:ph type="body" idx="1"/>
+          </p:nvPr>
+        </p:nvSpPr>
+        <p:spPr/>
+        <p:txBody>
+          <a:bodyPr/>
+          <a:lstStyle/>
+          <a:p>
+            <a:endParaRPr lang="en-US"/>
+          </a:p>
+        </p:txBody>
+      </p:sp>
+      <p:sp>
+        <p:nvSpPr>
+          <p:cNvPr id="4" name="Slide Number Placeholder 3"/>
+          <p:cNvSpPr>
+            <a:spLocks noGrp="1"/>
+          </p:cNvSpPr>
+          <p:nvPr>
+            <p:ph type="sldNum" sz="quarter" idx="10"/>
+          </p:nvPr>
+        </p:nvSpPr>
+        <p:spPr/>
+        <p:txBody>
+          <a:bodyPr/>
+          <a:lstStyle/>
+          <a:p>
+            <a:fld id="{F93199CD-3E1B-4AE6-990F-76F925F5EA9F}" type="slidenum">
+              <a:rPr lang="en-US"/>
+              <a:t>9</a:t>
+            </a:fld>
+            <a:endParaRPr lang="en-US"/>
+          </a:p>
+        </p:txBody>
+      </p:sp>
+    </p:spTree>
+    <p:extLst>
+      <p:ext uri="{BB962C8B-B14F-4D97-AF65-F5344CB8AC3E}">
+        <p14:creationId xmlns:p14="http://schemas.microsoft.com/office/powerpoint/2010/main" val="1648327386"/>
+      </p:ext>
+    </p:extLst>
+  </p:cSld>
+  <p:clrMapOvr>
+    <a:masterClrMapping/>
+  </p:clrMapOvr>
+</p:notes>
+</file>
+
 <file path=ppt/slideLayouts/slideLayout1.xml><?xml version="1.0" encoding="utf-8"?>
 <p:sldLayout xmlns:a="http://schemas.openxmlformats.org/drawingml/2006/main" xmlns:r="http://schemas.openxmlformats.org/officeDocument/2006/relationships" xmlns:p="http://schemas.openxmlformats.org/presentationml/2006/main" type="title" preserve="1">
   <p:cSld name="Title Slide">
@@ -729,7 +2158,7 @@
           </a:lstStyle>
           <a:p>
             <a:r>
-              <a:rPr lang="en-US" smtClean="0"/>
+              <a:rPr lang="en-US"/>
               <a:t>Click to edit Master title style</a:t>
             </a:r>
             <a:endParaRPr/>
@@ -851,7 +2280,7 @@
           </a:lstStyle>
           <a:p>
             <a:r>
-              <a:rPr lang="en-US" smtClean="0"/>
+              <a:rPr lang="en-US"/>
               <a:t>Click to edit Master subtitle style</a:t>
             </a:r>
             <a:endParaRPr/>
@@ -916,7 +2345,7 @@
           <a:lstStyle/>
           <a:p>
             <a:r>
-              <a:rPr lang="en-US" smtClean="0"/>
+              <a:rPr lang="en-US"/>
               <a:t>Click to edit Master title style</a:t>
             </a:r>
             <a:endParaRPr/>
@@ -940,35 +2369,35 @@
           <a:p>
             <a:pPr lvl="0"/>
             <a:r>
-              <a:rPr lang="en-US" smtClean="0"/>
+              <a:rPr lang="en-US"/>
               <a:t>Edit Master text styles</a:t>
             </a:r>
           </a:p>
           <a:p>
             <a:pPr lvl="1"/>
             <a:r>
-              <a:rPr lang="en-US" smtClean="0"/>
+              <a:rPr lang="en-US"/>
               <a:t>Second level</a:t>
             </a:r>
           </a:p>
           <a:p>
             <a:pPr lvl="2"/>
             <a:r>
-              <a:rPr lang="en-US" smtClean="0"/>
+              <a:rPr lang="en-US"/>
               <a:t>Third level</a:t>
             </a:r>
           </a:p>
           <a:p>
             <a:pPr lvl="3"/>
             <a:r>
-              <a:rPr lang="en-US" smtClean="0"/>
+              <a:rPr lang="en-US"/>
               <a:t>Fourth level</a:t>
             </a:r>
           </a:p>
           <a:p>
             <a:pPr lvl="4"/>
             <a:r>
-              <a:rPr lang="en-US" smtClean="0"/>
+              <a:rPr lang="en-US"/>
               <a:t>Fifth level</a:t>
             </a:r>
             <a:endParaRPr/>
@@ -992,7 +2421,7 @@
           <a:p>
             <a:fld id="{03F41C87-7AD9-4845-A077-840E4A0F3F06}" type="datetimeFigureOut">
               <a:rPr lang="en-US"/>
-              <a:t>2/17/2016</a:t>
+              <a:t>2/18/2016</a:t>
             </a:fld>
             <a:endParaRPr/>
           </a:p>
@@ -1103,7 +2532,7 @@
           <a:lstStyle/>
           <a:p>
             <a:r>
-              <a:rPr lang="en-US" smtClean="0"/>
+              <a:rPr lang="en-US"/>
               <a:t>Click to edit Master title style</a:t>
             </a:r>
             <a:endParaRPr/>
@@ -1132,35 +2561,35 @@
           <a:p>
             <a:pPr lvl="0"/>
             <a:r>
-              <a:rPr lang="en-US" smtClean="0"/>
+              <a:rPr lang="en-US"/>
               <a:t>Edit Master text styles</a:t>
             </a:r>
           </a:p>
           <a:p>
             <a:pPr lvl="1"/>
             <a:r>
-              <a:rPr lang="en-US" smtClean="0"/>
+              <a:rPr lang="en-US"/>
               <a:t>Second level</a:t>
             </a:r>
           </a:p>
           <a:p>
             <a:pPr lvl="2"/>
             <a:r>
-              <a:rPr lang="en-US" smtClean="0"/>
+              <a:rPr lang="en-US"/>
               <a:t>Third level</a:t>
             </a:r>
           </a:p>
           <a:p>
             <a:pPr lvl="3"/>
             <a:r>
-              <a:rPr lang="en-US" smtClean="0"/>
+              <a:rPr lang="en-US"/>
               <a:t>Fourth level</a:t>
             </a:r>
           </a:p>
           <a:p>
             <a:pPr lvl="4"/>
             <a:r>
-              <a:rPr lang="en-US" smtClean="0"/>
+              <a:rPr lang="en-US"/>
               <a:t>Fifth level</a:t>
             </a:r>
             <a:endParaRPr/>
@@ -1184,7 +2613,7 @@
           <a:p>
             <a:fld id="{03F41C87-7AD9-4845-A077-840E4A0F3F06}" type="datetimeFigureOut">
               <a:rPr lang="en-US"/>
-              <a:t>2/17/2016</a:t>
+              <a:t>2/18/2016</a:t>
             </a:fld>
             <a:endParaRPr/>
           </a:p>
@@ -1290,7 +2719,7 @@
           <a:lstStyle/>
           <a:p>
             <a:r>
-              <a:rPr lang="en-US" smtClean="0"/>
+              <a:rPr lang="en-US"/>
               <a:t>Click to edit Master title style</a:t>
             </a:r>
             <a:endParaRPr/>
@@ -1321,35 +2750,35 @@
           <a:p>
             <a:pPr lvl="0"/>
             <a:r>
-              <a:rPr lang="en-US" smtClean="0"/>
+              <a:rPr lang="en-US"/>
               <a:t>Edit Master text styles</a:t>
             </a:r>
           </a:p>
           <a:p>
             <a:pPr lvl="1"/>
             <a:r>
-              <a:rPr lang="en-US" smtClean="0"/>
+              <a:rPr lang="en-US"/>
               <a:t>Second level</a:t>
             </a:r>
           </a:p>
           <a:p>
             <a:pPr lvl="2"/>
             <a:r>
-              <a:rPr lang="en-US" smtClean="0"/>
+              <a:rPr lang="en-US"/>
               <a:t>Third level</a:t>
             </a:r>
           </a:p>
           <a:p>
             <a:pPr lvl="3"/>
             <a:r>
-              <a:rPr lang="en-US" smtClean="0"/>
+              <a:rPr lang="en-US"/>
               <a:t>Fourth level</a:t>
             </a:r>
           </a:p>
           <a:p>
             <a:pPr lvl="4"/>
             <a:r>
-              <a:rPr lang="en-US" smtClean="0"/>
+              <a:rPr lang="en-US"/>
               <a:t>Fifth level</a:t>
             </a:r>
             <a:endParaRPr/>
@@ -1373,7 +2802,7 @@
           <a:p>
             <a:fld id="{03F41C87-7AD9-4845-A077-840E4A0F3F06}" type="datetimeFigureOut">
               <a:rPr lang="en-US"/>
-              <a:t>2/17/2016</a:t>
+              <a:t>2/18/2016</a:t>
             </a:fld>
             <a:endParaRPr/>
           </a:p>
@@ -1507,7 +2936,7 @@
           </a:lstStyle>
           <a:p>
             <a:r>
-              <a:rPr lang="en-US" smtClean="0"/>
+              <a:rPr lang="en-US"/>
               <a:t>Click to edit Master title style</a:t>
             </a:r>
             <a:endParaRPr/>
@@ -1630,7 +3059,7 @@
           <a:p>
             <a:pPr lvl="0"/>
             <a:r>
-              <a:rPr lang="en-US" smtClean="0"/>
+              <a:rPr lang="en-US"/>
               <a:t>Edit Master text styles</a:t>
             </a:r>
           </a:p>
@@ -1653,7 +3082,7 @@
           <a:p>
             <a:fld id="{03F41C87-7AD9-4845-A077-840E4A0F3F06}" type="datetimeFigureOut">
               <a:rPr lang="en-US"/>
-              <a:t>2/17/2016</a:t>
+              <a:t>2/18/2016</a:t>
             </a:fld>
             <a:endParaRPr/>
           </a:p>
@@ -1759,7 +3188,7 @@
           <a:lstStyle/>
           <a:p>
             <a:r>
-              <a:rPr lang="en-US" smtClean="0"/>
+              <a:rPr lang="en-US"/>
               <a:t>Click to edit Master title style</a:t>
             </a:r>
             <a:endParaRPr/>
@@ -1818,35 +3247,35 @@
           <a:p>
             <a:pPr lvl="0"/>
             <a:r>
-              <a:rPr lang="en-US" smtClean="0"/>
+              <a:rPr lang="en-US"/>
               <a:t>Edit Master text styles</a:t>
             </a:r>
           </a:p>
           <a:p>
             <a:pPr lvl="1"/>
             <a:r>
-              <a:rPr lang="en-US" smtClean="0"/>
+              <a:rPr lang="en-US"/>
               <a:t>Second level</a:t>
             </a:r>
           </a:p>
           <a:p>
             <a:pPr lvl="2"/>
             <a:r>
-              <a:rPr lang="en-US" smtClean="0"/>
+              <a:rPr lang="en-US"/>
               <a:t>Third level</a:t>
             </a:r>
           </a:p>
           <a:p>
             <a:pPr lvl="3"/>
             <a:r>
-              <a:rPr lang="en-US" smtClean="0"/>
+              <a:rPr lang="en-US"/>
               <a:t>Fourth level</a:t>
             </a:r>
           </a:p>
           <a:p>
             <a:pPr lvl="4"/>
             <a:r>
-              <a:rPr lang="en-US" smtClean="0"/>
+              <a:rPr lang="en-US"/>
               <a:t>Fifth level</a:t>
             </a:r>
             <a:endParaRPr/>
@@ -1905,35 +3334,35 @@
           <a:p>
             <a:pPr lvl="0"/>
             <a:r>
-              <a:rPr lang="en-US" smtClean="0"/>
+              <a:rPr lang="en-US"/>
               <a:t>Edit Master text styles</a:t>
             </a:r>
           </a:p>
           <a:p>
             <a:pPr lvl="1"/>
             <a:r>
-              <a:rPr lang="en-US" smtClean="0"/>
+              <a:rPr lang="en-US"/>
               <a:t>Second level</a:t>
             </a:r>
           </a:p>
           <a:p>
             <a:pPr lvl="2"/>
             <a:r>
-              <a:rPr lang="en-US" smtClean="0"/>
+              <a:rPr lang="en-US"/>
               <a:t>Third level</a:t>
             </a:r>
           </a:p>
           <a:p>
             <a:pPr lvl="3"/>
             <a:r>
-              <a:rPr lang="en-US" smtClean="0"/>
+              <a:rPr lang="en-US"/>
               <a:t>Fourth level</a:t>
             </a:r>
           </a:p>
           <a:p>
             <a:pPr lvl="4"/>
             <a:r>
-              <a:rPr lang="en-US" smtClean="0"/>
+              <a:rPr lang="en-US"/>
               <a:t>Fifth level</a:t>
             </a:r>
             <a:endParaRPr/>
@@ -1957,7 +3386,7 @@
           <a:p>
             <a:fld id="{03F41C87-7AD9-4845-A077-840E4A0F3F06}" type="datetimeFigureOut">
               <a:rPr lang="en-US"/>
-              <a:t>2/17/2016</a:t>
+              <a:t>2/18/2016</a:t>
             </a:fld>
             <a:endParaRPr/>
           </a:p>
@@ -2067,7 +3496,7 @@
           </a:lstStyle>
           <a:p>
             <a:r>
-              <a:rPr lang="en-US" smtClean="0"/>
+              <a:rPr lang="en-US"/>
               <a:t>Click to edit Master title style</a:t>
             </a:r>
             <a:endParaRPr/>
@@ -2142,7 +3571,7 @@
           <a:p>
             <a:pPr lvl="0"/>
             <a:r>
-              <a:rPr lang="en-US" smtClean="0"/>
+              <a:rPr lang="en-US"/>
               <a:t>Edit Master text styles</a:t>
             </a:r>
           </a:p>
@@ -2200,35 +3629,35 @@
           <a:p>
             <a:pPr lvl="0"/>
             <a:r>
-              <a:rPr lang="en-US" smtClean="0"/>
+              <a:rPr lang="en-US"/>
               <a:t>Edit Master text styles</a:t>
             </a:r>
           </a:p>
           <a:p>
             <a:pPr lvl="1"/>
             <a:r>
-              <a:rPr lang="en-US" smtClean="0"/>
+              <a:rPr lang="en-US"/>
               <a:t>Second level</a:t>
             </a:r>
           </a:p>
           <a:p>
             <a:pPr lvl="2"/>
             <a:r>
-              <a:rPr lang="en-US" smtClean="0"/>
+              <a:rPr lang="en-US"/>
               <a:t>Third level</a:t>
             </a:r>
           </a:p>
           <a:p>
             <a:pPr lvl="3"/>
             <a:r>
-              <a:rPr lang="en-US" smtClean="0"/>
+              <a:rPr lang="en-US"/>
               <a:t>Fourth level</a:t>
             </a:r>
           </a:p>
           <a:p>
             <a:pPr lvl="4"/>
             <a:r>
-              <a:rPr lang="en-US" smtClean="0"/>
+              <a:rPr lang="en-US"/>
               <a:t>Fifth level</a:t>
             </a:r>
             <a:endParaRPr/>
@@ -2303,7 +3732,7 @@
           <a:p>
             <a:pPr lvl="0"/>
             <a:r>
-              <a:rPr lang="en-US" smtClean="0"/>
+              <a:rPr lang="en-US"/>
               <a:t>Edit Master text styles</a:t>
             </a:r>
           </a:p>
@@ -2361,35 +3790,35 @@
           <a:p>
             <a:pPr lvl="0"/>
             <a:r>
-              <a:rPr lang="en-US" smtClean="0"/>
+              <a:rPr lang="en-US"/>
               <a:t>Edit Master text styles</a:t>
             </a:r>
           </a:p>
           <a:p>
             <a:pPr lvl="1"/>
             <a:r>
-              <a:rPr lang="en-US" smtClean="0"/>
+              <a:rPr lang="en-US"/>
               <a:t>Second level</a:t>
             </a:r>
           </a:p>
           <a:p>
             <a:pPr lvl="2"/>
             <a:r>
-              <a:rPr lang="en-US" smtClean="0"/>
+              <a:rPr lang="en-US"/>
               <a:t>Third level</a:t>
             </a:r>
           </a:p>
           <a:p>
             <a:pPr lvl="3"/>
             <a:r>
-              <a:rPr lang="en-US" smtClean="0"/>
+              <a:rPr lang="en-US"/>
               <a:t>Fourth level</a:t>
             </a:r>
           </a:p>
           <a:p>
             <a:pPr lvl="4"/>
             <a:r>
-              <a:rPr lang="en-US" smtClean="0"/>
+              <a:rPr lang="en-US"/>
               <a:t>Fifth level</a:t>
             </a:r>
             <a:endParaRPr/>
@@ -2413,7 +3842,7 @@
           <a:p>
             <a:fld id="{03F41C87-7AD9-4845-A077-840E4A0F3F06}" type="datetimeFigureOut">
               <a:rPr lang="en-US"/>
-              <a:t>2/17/2016</a:t>
+              <a:t>2/18/2016</a:t>
             </a:fld>
             <a:endParaRPr/>
           </a:p>
@@ -2519,7 +3948,7 @@
           <a:lstStyle/>
           <a:p>
             <a:r>
-              <a:rPr lang="en-US" smtClean="0"/>
+              <a:rPr lang="en-US"/>
               <a:t>Click to edit Master title style</a:t>
             </a:r>
             <a:endParaRPr/>
@@ -2543,7 +3972,7 @@
           <a:p>
             <a:fld id="{03F41C87-7AD9-4845-A077-840E4A0F3F06}" type="datetimeFigureOut">
               <a:rPr lang="en-US"/>
-              <a:t>2/17/2016</a:t>
+              <a:t>2/18/2016</a:t>
             </a:fld>
             <a:endParaRPr/>
           </a:p>
@@ -2658,7 +4087,7 @@
           <a:p>
             <a:fld id="{03F41C87-7AD9-4845-A077-840E4A0F3F06}" type="datetimeFigureOut">
               <a:rPr lang="en-US"/>
-              <a:t>2/17/2016</a:t>
+              <a:t>2/18/2016</a:t>
             </a:fld>
             <a:endParaRPr/>
           </a:p>
@@ -2796,7 +4225,7 @@
           </a:lstStyle>
           <a:p>
             <a:r>
-              <a:rPr lang="en-US" smtClean="0"/>
+              <a:rPr lang="en-US"/>
               <a:t>Click to edit Master title style</a:t>
             </a:r>
             <a:endParaRPr/>
@@ -2855,35 +4284,35 @@
           <a:p>
             <a:pPr lvl="0"/>
             <a:r>
-              <a:rPr lang="en-US" smtClean="0"/>
+              <a:rPr lang="en-US"/>
               <a:t>Edit Master text styles</a:t>
             </a:r>
           </a:p>
           <a:p>
             <a:pPr lvl="1"/>
             <a:r>
-              <a:rPr lang="en-US" smtClean="0"/>
+              <a:rPr lang="en-US"/>
               <a:t>Second level</a:t>
             </a:r>
           </a:p>
           <a:p>
             <a:pPr lvl="2"/>
             <a:r>
-              <a:rPr lang="en-US" smtClean="0"/>
+              <a:rPr lang="en-US"/>
               <a:t>Third level</a:t>
             </a:r>
           </a:p>
           <a:p>
             <a:pPr lvl="3"/>
             <a:r>
-              <a:rPr lang="en-US" smtClean="0"/>
+              <a:rPr lang="en-US"/>
               <a:t>Fourth level</a:t>
             </a:r>
           </a:p>
           <a:p>
             <a:pPr lvl="4"/>
             <a:r>
-              <a:rPr lang="en-US" smtClean="0"/>
+              <a:rPr lang="en-US"/>
               <a:t>Fifth level</a:t>
             </a:r>
             <a:endParaRPr/>
@@ -2957,7 +4386,7 @@
           <a:p>
             <a:pPr lvl="0"/>
             <a:r>
-              <a:rPr lang="en-US" smtClean="0"/>
+              <a:rPr lang="en-US"/>
               <a:t>Edit Master text styles</a:t>
             </a:r>
           </a:p>
@@ -2980,7 +4409,7 @@
           <a:p>
             <a:fld id="{03F41C87-7AD9-4845-A077-840E4A0F3F06}" type="datetimeFigureOut">
               <a:rPr lang="en-US"/>
-              <a:t>2/17/2016</a:t>
+              <a:t>2/18/2016</a:t>
             </a:fld>
             <a:endParaRPr/>
           </a:p>
@@ -3153,7 +4582,7 @@
           </a:lstStyle>
           <a:p>
             <a:r>
-              <a:rPr lang="en-US" smtClean="0"/>
+              <a:rPr lang="en-US"/>
               <a:t>Click icon to add picture</a:t>
             </a:r>
             <a:endParaRPr/>
@@ -3194,7 +4623,7 @@
           </a:lstStyle>
           <a:p>
             <a:r>
-              <a:rPr lang="en-US" smtClean="0"/>
+              <a:rPr lang="en-US"/>
               <a:t>Click to edit Master title style</a:t>
             </a:r>
             <a:endParaRPr/>
@@ -3268,7 +4697,7 @@
           <a:p>
             <a:pPr lvl="0"/>
             <a:r>
-              <a:rPr lang="en-US" smtClean="0"/>
+              <a:rPr lang="en-US"/>
               <a:t>Edit Master text styles</a:t>
             </a:r>
           </a:p>
@@ -3292,7 +4721,7 @@
             <a:fld id="{03F41C87-7AD9-4845-A077-840E4A0F3F06}" type="datetimeFigureOut">
               <a:rPr lang="en-US"/>
               <a:pPr/>
-              <a:t>2/17/2016</a:t>
+              <a:t>2/18/2016</a:t>
             </a:fld>
             <a:endParaRPr/>
           </a:p>
@@ -3423,7 +4852,7 @@
           <a:lstStyle/>
           <a:p>
             <a:r>
-              <a:rPr lang="en-US" smtClean="0"/>
+              <a:rPr lang="en-US"/>
               <a:t>Click to edit Master title style</a:t>
             </a:r>
             <a:endParaRPr/>
@@ -3457,35 +4886,35 @@
           <a:p>
             <a:pPr lvl="0"/>
             <a:r>
-              <a:rPr lang="en-US" smtClean="0"/>
+              <a:rPr lang="en-US"/>
               <a:t>Edit Master text styles</a:t>
             </a:r>
           </a:p>
           <a:p>
             <a:pPr lvl="1"/>
             <a:r>
-              <a:rPr lang="en-US" smtClean="0"/>
+              <a:rPr lang="en-US"/>
               <a:t>Second level</a:t>
             </a:r>
           </a:p>
           <a:p>
             <a:pPr lvl="2"/>
             <a:r>
-              <a:rPr lang="en-US" smtClean="0"/>
+              <a:rPr lang="en-US"/>
               <a:t>Third level</a:t>
             </a:r>
           </a:p>
           <a:p>
             <a:pPr lvl="3"/>
             <a:r>
-              <a:rPr lang="en-US" smtClean="0"/>
+              <a:rPr lang="en-US"/>
               <a:t>Fourth level</a:t>
             </a:r>
           </a:p>
           <a:p>
             <a:pPr lvl="4"/>
             <a:r>
-              <a:rPr lang="en-US" smtClean="0"/>
+              <a:rPr lang="en-US"/>
               <a:t>Fifth level</a:t>
             </a:r>
             <a:endParaRPr dirty="0"/>
@@ -3528,7 +4957,7 @@
             <a:fld id="{03F41C87-7AD9-4845-A077-840E4A0F3F06}" type="datetimeFigureOut">
               <a:rPr lang="en-US"/>
               <a:pPr/>
-              <a:t>2/17/2016</a:t>
+              <a:t>2/18/2016</a:t>
             </a:fld>
             <a:endParaRPr/>
           </a:p>
@@ -4003,14 +5432,13 @@
           <a:lstStyle/>
           <a:p>
             <a:r>
-              <a:rPr lang="en-US" dirty="0" err="1" smtClean="0"/>
+              <a:rPr lang="en-US" dirty="0" err="1"/>
               <a:t>Rossman</a:t>
             </a:r>
             <a:r>
-              <a:rPr lang="en-US" dirty="0" smtClean="0"/>
+              <a:rPr lang="en-US" dirty="0"/>
               <a:t> Project</a:t>
             </a:r>
-            <a:endParaRPr lang="en-US" dirty="0"/>
           </a:p>
         </p:txBody>
       </p:sp>
@@ -4030,16 +5458,15 @@
           <a:lstStyle/>
           <a:p>
             <a:r>
-              <a:rPr lang="it-IT" sz="2400" dirty="0" smtClean="0"/>
+              <a:rPr lang="it-IT" sz="2400" dirty="0"/>
               <a:t>Team Awesome Incredible: </a:t>
             </a:r>
           </a:p>
           <a:p>
             <a:r>
-              <a:rPr lang="it-IT" dirty="0" smtClean="0"/>
+              <a:rPr lang="it-IT" dirty="0"/>
               <a:t>Avinash Kamath, Kyle bartsch, prateek bhadsavle</a:t>
             </a:r>
-            <a:endParaRPr lang="it-IT" dirty="0"/>
           </a:p>
         </p:txBody>
       </p:sp>
@@ -4101,10 +5528,9 @@
           <a:lstStyle/>
           <a:p>
             <a:r>
-              <a:rPr lang="en-US" dirty="0" smtClean="0"/>
+              <a:rPr lang="en-US" dirty="0"/>
               <a:t>Exploratory Data Analysis</a:t>
             </a:r>
-            <a:endParaRPr lang="en-US" dirty="0"/>
           </a:p>
         </p:txBody>
       </p:sp>
@@ -4185,10 +5611,9 @@
           <a:lstStyle/>
           <a:p>
             <a:r>
-              <a:rPr lang="en-US" dirty="0" smtClean="0"/>
+              <a:rPr lang="en-US" dirty="0"/>
               <a:t>Univariate EDA</a:t>
             </a:r>
-            <a:endParaRPr lang="en-US" dirty="0"/>
           </a:p>
         </p:txBody>
       </p:sp>
@@ -4269,10 +5694,9 @@
           <a:lstStyle/>
           <a:p>
             <a:r>
-              <a:rPr lang="en-US" dirty="0" smtClean="0"/>
+              <a:rPr lang="en-US" dirty="0"/>
               <a:t>Bivariate EDA</a:t>
             </a:r>
-            <a:endParaRPr lang="en-US" dirty="0"/>
           </a:p>
         </p:txBody>
       </p:sp>
@@ -4358,10 +5782,9 @@
           <a:lstStyle/>
           <a:p>
             <a:r>
-              <a:rPr lang="en-US" dirty="0" smtClean="0"/>
+              <a:rPr lang="en-US" dirty="0"/>
               <a:t>Sales vs. Total Customers/Store Type </a:t>
             </a:r>
-            <a:endParaRPr lang="en-US" dirty="0"/>
           </a:p>
         </p:txBody>
       </p:sp>
@@ -4376,7 +5799,7 @@
           </p:nvPr>
         </p:nvPicPr>
         <p:blipFill>
-          <a:blip r:embed="rId2">
+          <a:blip r:embed="rId3">
             <a:extLst>
               <a:ext uri="{28A0092B-C50C-407E-A947-70E740481C1C}">
                 <a14:useLocalDpi xmlns:a14="http://schemas.microsoft.com/office/drawing/2010/main" val="0"/>
@@ -4452,10 +5875,9 @@
           <a:lstStyle/>
           <a:p>
             <a:r>
-              <a:rPr lang="en-US" dirty="0" smtClean="0"/>
+              <a:rPr lang="en-US" dirty="0"/>
               <a:t>Plans for data modeling</a:t>
             </a:r>
-            <a:endParaRPr lang="en-US" dirty="0"/>
           </a:p>
         </p:txBody>
       </p:sp>
@@ -4541,10 +5963,13 @@
           <a:lstStyle/>
           <a:p>
             <a:r>
-              <a:rPr lang="en-US" dirty="0" smtClean="0"/>
-              <a:t>Modeling Techniques To Consider: </a:t>
-            </a:r>
-            <a:endParaRPr lang="en-US" dirty="0"/>
+              <a:rPr lang="en-US" sz="4000" dirty="0"/>
+              <a:t>Modeling Techniques To Consider:</a:t>
+            </a:r>
+            <a:r>
+              <a:rPr lang="en-US" dirty="0"/>
+              <a:t> </a:t>
+            </a:r>
           </a:p>
         </p:txBody>
       </p:sp>
@@ -4565,74 +5990,89 @@
           </a:xfrm>
         </p:spPr>
         <p:txBody>
-          <a:bodyPr>
+          <a:bodyPr vert="horz" lIns="91440" tIns="45720" rIns="91440" bIns="45720" rtlCol="0" anchor="t">
             <a:normAutofit/>
           </a:bodyPr>
           <a:lstStyle/>
           <a:p>
             <a:r>
-              <a:rPr lang="en-US" dirty="0" smtClean="0"/>
+              <a:rPr lang="en-US" sz="3200" dirty="0"/>
               <a:t>Traditional Linear Regression </a:t>
             </a:r>
           </a:p>
           <a:p>
             <a:pPr lvl="1"/>
             <a:r>
-              <a:rPr lang="en-US" dirty="0" smtClean="0"/>
+              <a:rPr lang="en-US" sz="2400" dirty="0"/>
               <a:t>Start with stepwise selection for dimension reduction </a:t>
             </a:r>
           </a:p>
           <a:p>
             <a:pPr lvl="1"/>
             <a:r>
-              <a:rPr lang="en-US" dirty="0" smtClean="0"/>
+              <a:rPr lang="en-US" sz="2400" dirty="0"/>
               <a:t>Determine optimal # of dimensions based on AIC </a:t>
             </a:r>
           </a:p>
           <a:p>
-            <a:r>
-              <a:rPr lang="en-US" dirty="0" smtClean="0"/>
-              <a:t>Decision Trees</a:t>
-            </a:r>
-          </a:p>
-          <a:p>
             <a:pPr lvl="1"/>
             <a:r>
-              <a:rPr lang="en-US" dirty="0" smtClean="0"/>
+              <a:rPr lang="en-US" sz="2400" dirty="0"/>
+              <a:t>Add higher order terms?</a:t>
+            </a:r>
+            <a:r>
+              <a:rPr lang="en-US" dirty="0"/>
+              <a:t> </a:t>
+            </a:r>
+          </a:p>
+          <a:p>
+            <a:r>
+              <a:rPr lang="en-US" sz="3200" dirty="0"/>
+              <a:t>Regression Trees</a:t>
+            </a:r>
+          </a:p>
+          <a:p>
+            <a:pPr lvl="1"/>
+            <a:r>
+              <a:rPr lang="en-US" sz="2400" dirty="0"/>
               <a:t>Start will all dimensions</a:t>
             </a:r>
           </a:p>
           <a:p>
             <a:pPr lvl="1"/>
             <a:r>
-              <a:rPr lang="en-US" dirty="0" smtClean="0"/>
-              <a:t>Prune tree to find most parsimonious model </a:t>
-            </a:r>
-          </a:p>
-          <a:p>
-            <a:r>
-              <a:rPr lang="en-US" dirty="0" smtClean="0"/>
-              <a:t>Bagging </a:t>
+              <a:rPr lang="en-US" sz="2400" dirty="0"/>
+              <a:t>Prune tree to find most parsimonious model</a:t>
+            </a:r>
+            <a:r>
+              <a:rPr lang="en-US" dirty="0"/>
+              <a:t> </a:t>
+            </a:r>
+          </a:p>
+          <a:p>
+            <a:r>
+              <a:rPr lang="en-US" sz="3200" dirty="0"/>
+              <a:t>Bagging (Bootstrap Aggregating) </a:t>
+            </a:r>
+            <a:r>
+              <a:rPr lang="en-US" dirty="0"/>
+              <a:t> </a:t>
             </a:r>
           </a:p>
           <a:p>
             <a:pPr lvl="1"/>
-            <a:endParaRPr lang="en-US" dirty="0" smtClean="0"/>
-          </a:p>
-          <a:p>
-            <a:r>
-              <a:rPr lang="en-US" dirty="0" smtClean="0"/>
-              <a:t>Random Forest </a:t>
-            </a:r>
-          </a:p>
-          <a:p>
-            <a:r>
-              <a:rPr lang="en-US" dirty="0" smtClean="0"/>
-              <a:t>Boosting </a:t>
-            </a:r>
-          </a:p>
-          <a:p>
-            <a:endParaRPr lang="en-US" dirty="0"/>
+            <a:r>
+              <a:rPr lang="en-US" sz="2400" dirty="0"/>
+              <a:t>Use all dimensions – be wary of overfitting</a:t>
+            </a:r>
+            <a:r>
+              <a:rPr lang="en-US" sz="2800" dirty="0"/>
+              <a:t> </a:t>
+            </a:r>
+            <a:r>
+              <a:rPr lang="en-US" dirty="0"/>
+              <a:t> </a:t>
+            </a:r>
           </a:p>
         </p:txBody>
       </p:sp>
@@ -4690,6 +6130,165 @@
         </p:nvSpPr>
         <p:spPr>
           <a:xfrm>
+            <a:off x="912812" y="152400"/>
+            <a:ext cx="9144001" cy="762000"/>
+          </a:xfrm>
+        </p:spPr>
+        <p:txBody>
+          <a:bodyPr/>
+          <a:lstStyle/>
+          <a:p>
+            <a:r>
+              <a:rPr lang="en-US" sz="4000" dirty="0"/>
+              <a:t>Modeling Techniques To Consider: </a:t>
+            </a:r>
+          </a:p>
+        </p:txBody>
+      </p:sp>
+      <p:sp>
+        <p:nvSpPr>
+          <p:cNvPr id="3" name="Content Placeholder 2"/>
+          <p:cNvSpPr>
+            <a:spLocks noGrp="1"/>
+          </p:cNvSpPr>
+          <p:nvPr>
+            <p:ph idx="1"/>
+          </p:nvPr>
+        </p:nvSpPr>
+        <p:spPr>
+          <a:xfrm>
+            <a:off x="1065213" y="1066800"/>
+            <a:ext cx="10134600" cy="3951240"/>
+          </a:xfrm>
+        </p:spPr>
+        <p:txBody>
+          <a:bodyPr vert="horz" lIns="91440" tIns="45720" rIns="91440" bIns="45720" rtlCol="0" anchor="t">
+            <a:normAutofit/>
+          </a:bodyPr>
+          <a:lstStyle/>
+          <a:p>
+            <a:r>
+              <a:rPr lang="en-US" sz="3200" dirty="0"/>
+              <a:t>Random Forest </a:t>
+            </a:r>
+          </a:p>
+          <a:p>
+            <a:pPr lvl="2"/>
+            <a:r>
+              <a:rPr lang="en-US" sz="2400" dirty="0"/>
+              <a:t># of dimensions (usually square root of # of dimensions)</a:t>
+            </a:r>
+          </a:p>
+          <a:p>
+            <a:r>
+              <a:rPr lang="en-US" sz="3200" dirty="0"/>
+              <a:t>Boosting</a:t>
+            </a:r>
+          </a:p>
+          <a:p>
+            <a:pPr lvl="1"/>
+            <a:r>
+              <a:rPr lang="en-US" sz="2800" dirty="0"/>
+              <a:t>Parameter Tuning: </a:t>
+            </a:r>
+          </a:p>
+          <a:p>
+            <a:pPr lvl="2"/>
+            <a:r>
+              <a:rPr lang="en-US" sz="2400" dirty="0"/>
+              <a:t># of </a:t>
+            </a:r>
+            <a:r>
+              <a:rPr lang="en-US" sz="2400" dirty="0" smtClean="0"/>
+              <a:t>trees </a:t>
+            </a:r>
+            <a:r>
+              <a:rPr lang="en-US" sz="2400" dirty="0"/>
+              <a:t>to build</a:t>
+            </a:r>
+          </a:p>
+          <a:p>
+            <a:pPr lvl="2"/>
+            <a:r>
+              <a:rPr lang="en-US" sz="2400" dirty="0"/>
+              <a:t>Interaction </a:t>
+            </a:r>
+            <a:r>
+              <a:rPr lang="en-US" sz="2400" dirty="0" smtClean="0"/>
+              <a:t>depth  </a:t>
+            </a:r>
+            <a:endParaRPr lang="en-US" sz="2400" dirty="0"/>
+          </a:p>
+          <a:p>
+            <a:pPr lvl="2"/>
+            <a:r>
+              <a:rPr lang="en-US" sz="2400" dirty="0"/>
+              <a:t>Shrinkage </a:t>
+            </a:r>
+            <a:r>
+              <a:rPr lang="en-US" dirty="0"/>
+              <a:t> </a:t>
+            </a:r>
+          </a:p>
+          <a:p>
+            <a:endParaRPr lang="en-US" dirty="0"/>
+          </a:p>
+        </p:txBody>
+      </p:sp>
+    </p:spTree>
+    <p:extLst>
+      <p:ext uri="{BB962C8B-B14F-4D97-AF65-F5344CB8AC3E}">
+        <p14:creationId xmlns:p14="http://schemas.microsoft.com/office/powerpoint/2010/main" val="3265838435"/>
+      </p:ext>
+    </p:extLst>
+  </p:cSld>
+  <p:clrMapOvr>
+    <a:masterClrMapping/>
+  </p:clrMapOvr>
+  <mc:AlternateContent xmlns:mc="http://schemas.openxmlformats.org/markup-compatibility/2006" xmlns:p14="http://schemas.microsoft.com/office/powerpoint/2010/main">
+    <mc:Choice Requires="p14">
+      <p:transition spd="med" p14:dur="700">
+        <p:fade/>
+      </p:transition>
+    </mc:Choice>
+    <mc:Fallback xmlns="">
+      <p:transition spd="med">
+        <p:fade/>
+      </p:transition>
+    </mc:Fallback>
+  </mc:AlternateContent>
+</p:sld>
+</file>
+
+<file path=ppt/slides/slide17.xml><?xml version="1.0" encoding="utf-8"?>
+<p:sld xmlns:a="http://schemas.openxmlformats.org/drawingml/2006/main" xmlns:r="http://schemas.openxmlformats.org/officeDocument/2006/relationships" xmlns:p="http://schemas.openxmlformats.org/presentationml/2006/main">
+  <p:cSld>
+    <p:spTree>
+      <p:nvGrpSpPr>
+        <p:cNvPr id="1" name=""/>
+        <p:cNvGrpSpPr/>
+        <p:nvPr/>
+      </p:nvGrpSpPr>
+      <p:grpSpPr>
+        <a:xfrm>
+          <a:off x="0" y="0"/>
+          <a:ext cx="0" cy="0"/>
+          <a:chOff x="0" y="0"/>
+          <a:chExt cx="0" cy="0"/>
+        </a:xfrm>
+      </p:grpSpPr>
+      <p:sp>
+        <p:nvSpPr>
+          <p:cNvPr id="2" name="Title 1"/>
+          <p:cNvSpPr>
+            <a:spLocks noGrp="1"/>
+          </p:cNvSpPr>
+          <p:nvPr>
+            <p:ph type="title"/>
+          </p:nvPr>
+        </p:nvSpPr>
+        <p:spPr>
+          <a:xfrm>
             <a:off x="1512803" y="533400"/>
             <a:ext cx="9144001" cy="762000"/>
           </a:xfrm>
@@ -4699,10 +6298,9 @@
           <a:lstStyle/>
           <a:p>
             <a:r>
-              <a:rPr lang="en-US" dirty="0" smtClean="0"/>
+              <a:rPr lang="en-US" sz="4000" dirty="0"/>
               <a:t>General Modeling Parameters</a:t>
             </a:r>
-            <a:endParaRPr lang="en-US" dirty="0"/>
           </a:p>
         </p:txBody>
       </p:sp>
@@ -4723,31 +6321,12 @@
           </a:xfrm>
         </p:spPr>
         <p:txBody>
-          <a:bodyPr/>
-          <a:lstStyle/>
-          <a:p>
-            <a:r>
-              <a:rPr lang="en-US" dirty="0" smtClean="0"/>
-              <a:t>Models will be </a:t>
-            </a:r>
-            <a:r>
-              <a:rPr lang="en-US" dirty="0" smtClean="0"/>
-              <a:t>optimized using 5-Fold Cross Validation  and the Caret Package </a:t>
-            </a:r>
-          </a:p>
+          <a:bodyPr vert="horz" lIns="91440" tIns="45720" rIns="91440" bIns="45720" rtlCol="0" anchor="t">
+            <a:normAutofit/>
+          </a:bodyPr>
+          <a:lstStyle/>
           <a:p>
             <a:pPr lvl="1"/>
-            <a:r>
-              <a:rPr lang="en-US" dirty="0" smtClean="0"/>
-              <a:t>Regression will use lowest 5-Fold RMSE</a:t>
-            </a:r>
-          </a:p>
-          <a:p>
-            <a:pPr lvl="1"/>
-            <a:r>
-              <a:rPr lang="en-US" dirty="0" smtClean="0"/>
-              <a:t> </a:t>
-            </a:r>
             <a:endParaRPr lang="en-US" dirty="0"/>
           </a:p>
         </p:txBody>
@@ -4810,10 +6389,9 @@
           <a:lstStyle/>
           <a:p>
             <a:r>
-              <a:rPr lang="en-US" dirty="0" smtClean="0"/>
+              <a:rPr lang="en-US" dirty="0"/>
               <a:t>About the dataset</a:t>
             </a:r>
-            <a:endParaRPr lang="en-US" dirty="0"/>
           </a:p>
         </p:txBody>
       </p:sp>
@@ -4894,14 +6472,13 @@
           <a:lstStyle/>
           <a:p>
             <a:r>
-              <a:rPr lang="en-US" u="sng" dirty="0" err="1" smtClean="0"/>
+              <a:rPr lang="en-US" u="sng" dirty="0" err="1"/>
               <a:t>Rossman</a:t>
             </a:r>
             <a:r>
-              <a:rPr lang="en-US" u="sng" dirty="0" smtClean="0"/>
+              <a:rPr lang="en-US" u="sng" dirty="0"/>
               <a:t> Dataset</a:t>
             </a:r>
-            <a:endParaRPr lang="en-US" u="sng" dirty="0"/>
           </a:p>
         </p:txBody>
       </p:sp>
@@ -4921,16 +6498,15 @@
           <a:lstStyle/>
           <a:p>
             <a:r>
-              <a:rPr lang="en-US" dirty="0" smtClean="0"/>
+              <a:rPr lang="en-US" dirty="0"/>
               <a:t>Sales</a:t>
             </a:r>
           </a:p>
           <a:p>
             <a:r>
-              <a:rPr lang="en-US" dirty="0" smtClean="0"/>
+              <a:rPr lang="en-US" dirty="0"/>
               <a:t>Stores</a:t>
             </a:r>
-            <a:endParaRPr lang="en-US" dirty="0"/>
           </a:p>
         </p:txBody>
       </p:sp>
@@ -4992,10 +6568,9 @@
           <a:lstStyle/>
           <a:p>
             <a:r>
-              <a:rPr lang="en-US" dirty="0" smtClean="0"/>
+              <a:rPr lang="en-US" dirty="0"/>
               <a:t>Data Cleansing</a:t>
             </a:r>
-            <a:endParaRPr lang="en-US" dirty="0"/>
           </a:p>
         </p:txBody>
       </p:sp>
@@ -5070,16 +6645,20 @@
             <p:ph type="title"/>
           </p:nvPr>
         </p:nvSpPr>
-        <p:spPr/>
-        <p:txBody>
-          <a:bodyPr/>
-          <a:lstStyle/>
-          <a:p>
-            <a:r>
-              <a:rPr lang="en-US" u="sng" dirty="0" smtClean="0"/>
-              <a:t>Data Cleansing </a:t>
-            </a:r>
-            <a:endParaRPr lang="en-US" u="sng" dirty="0"/>
+        <p:spPr>
+          <a:xfrm>
+            <a:off x="1132084" y="499826"/>
+            <a:ext cx="9144000" cy="726541"/>
+          </a:xfrm>
+        </p:spPr>
+        <p:txBody>
+          <a:bodyPr/>
+          <a:lstStyle/>
+          <a:p>
+            <a:r>
+              <a:rPr lang="en-US" u="sng" dirty="0"/>
+              <a:t>Data Types</a:t>
+            </a:r>
           </a:p>
         </p:txBody>
       </p:sp>
@@ -5093,12 +6672,43 @@
             <p:ph idx="1"/>
           </p:nvPr>
         </p:nvSpPr>
-        <p:spPr/>
-        <p:txBody>
-          <a:bodyPr/>
-          <a:lstStyle/>
-          <a:p>
-            <a:endParaRPr lang="en-US" dirty="0"/>
+        <p:spPr>
+          <a:xfrm>
+            <a:off x="1131888" y="1481138"/>
+            <a:ext cx="9660570" cy="4691958"/>
+          </a:xfrm>
+        </p:spPr>
+        <p:txBody>
+          <a:bodyPr vert="horz" lIns="91440" tIns="45720" rIns="91440" bIns="45720" rtlCol="0" anchor="t">
+            <a:normAutofit/>
+          </a:bodyPr>
+          <a:lstStyle/>
+          <a:p>
+            <a:r>
+              <a:rPr lang="en-US" sz="2800" dirty="0"/>
+              <a:t>Many variables need to be converted to correct data types:</a:t>
+            </a:r>
+          </a:p>
+          <a:p>
+            <a:pPr lvl="2"/>
+            <a:r>
+              <a:rPr lang="en-US" sz="3000" dirty="0"/>
+              <a:t>Integers -&gt; Factors</a:t>
+            </a:r>
+          </a:p>
+          <a:p>
+            <a:pPr lvl="2"/>
+            <a:r>
+              <a:rPr lang="en-US" sz="3000" dirty="0"/>
+              <a:t>Factors -&gt; Dates</a:t>
+            </a:r>
+          </a:p>
+          <a:p>
+            <a:pPr lvl="2"/>
+            <a:r>
+              <a:rPr lang="en-US" sz="3000" dirty="0"/>
+              <a:t>Factors -&gt; Integers </a:t>
+            </a:r>
           </a:p>
         </p:txBody>
       </p:sp>
@@ -5156,7 +6766,7 @@
         </p:nvSpPr>
         <p:spPr>
           <a:xfrm>
-            <a:off x="1217612" y="381000"/>
+            <a:off x="895166" y="177297"/>
             <a:ext cx="9144001" cy="914400"/>
           </a:xfrm>
         </p:spPr>
@@ -5165,10 +6775,9 @@
           <a:lstStyle/>
           <a:p>
             <a:r>
-              <a:rPr lang="en-US" u="sng" dirty="0" smtClean="0"/>
+              <a:rPr lang="en-US" sz="4000" u="sng" dirty="0"/>
               <a:t>Missing Values</a:t>
             </a:r>
-            <a:endParaRPr lang="en-US" u="sng" dirty="0"/>
           </a:p>
         </p:txBody>
       </p:sp>
@@ -5184,23 +6793,25 @@
         </p:nvSpPr>
         <p:spPr>
           <a:xfrm>
-            <a:off x="1227222" y="1676400"/>
-            <a:ext cx="9896390" cy="4114800"/>
+            <a:off x="650130" y="1336675"/>
+            <a:ext cx="10473483" cy="4979988"/>
           </a:xfrm>
         </p:spPr>
         <p:txBody>
-          <a:bodyPr/>
-          <a:lstStyle/>
-          <a:p>
-            <a:r>
-              <a:rPr lang="en-US" dirty="0" smtClean="0"/>
+          <a:bodyPr vert="horz" lIns="91440" tIns="45720" rIns="91440" bIns="45720" rtlCol="0" anchor="t">
+            <a:normAutofit/>
+          </a:bodyPr>
+          <a:lstStyle/>
+          <a:p>
+            <a:r>
+              <a:rPr lang="en-US" sz="3200" dirty="0"/>
               <a:t>Stores Dataset: </a:t>
             </a:r>
           </a:p>
           <a:p>
             <a:pPr lvl="1"/>
             <a:r>
-              <a:rPr lang="en-US" dirty="0" smtClean="0"/>
+              <a:rPr lang="en-US" sz="2800" dirty="0"/>
               <a:t>Competition Distance – only for 3 stores (81,862,957)</a:t>
             </a:r>
           </a:p>
@@ -5208,51 +6819,55 @@
             <a:pPr marL="231775" lvl="1" indent="0">
               <a:buNone/>
             </a:pPr>
-            <a:endParaRPr lang="en-US" dirty="0" smtClean="0"/>
+            <a:endParaRPr lang="en-US" dirty="0"/>
           </a:p>
           <a:p>
             <a:pPr lvl="1"/>
             <a:r>
-              <a:rPr lang="en-US" dirty="0" smtClean="0"/>
+              <a:rPr lang="en-US" sz="2800" dirty="0"/>
               <a:t>Competition Open Since Month / Competition Open Since Year – 317 stores </a:t>
             </a:r>
           </a:p>
           <a:p>
             <a:pPr lvl="2"/>
             <a:r>
-              <a:rPr lang="en-US" dirty="0" smtClean="0"/>
-              <a:t>Affects Competition </a:t>
+              <a:rPr lang="en-US" sz="2400" dirty="0"/>
+              <a:t>Affects Competition Open Date – if values are NA,</a:t>
             </a:r>
             <a:r>
               <a:rPr lang="en-US" dirty="0"/>
-              <a:t>Open Date – if values are NA, </a:t>
+              <a:t> </a:t>
             </a:r>
           </a:p>
           <a:p>
             <a:pPr lvl="2"/>
-            <a:endParaRPr lang="en-US" dirty="0" smtClean="0"/>
+            <a:endParaRPr lang="en-US" dirty="0"/>
           </a:p>
           <a:p>
             <a:pPr lvl="1"/>
             <a:r>
-              <a:rPr lang="en-US" dirty="0" smtClean="0"/>
-              <a:t>Promo2 Since Week / Promo2 Since Year – 486 Stores </a:t>
+              <a:rPr lang="en-US" sz="2800" dirty="0"/>
+              <a:t>Promo2 Since Week / Promo2 Since Year – 486 Stores</a:t>
+            </a:r>
+            <a:r>
+              <a:rPr lang="en-US" dirty="0"/>
+              <a:t> </a:t>
             </a:r>
           </a:p>
           <a:p>
             <a:pPr lvl="2"/>
             <a:r>
-              <a:rPr lang="en-US" dirty="0" smtClean="0"/>
-              <a:t>Affects </a:t>
+              <a:rPr lang="en-US" sz="2400" dirty="0"/>
+              <a:t>Affects Promo2 – Appears if Promo2 = 0, it never was offered and the date values are truly unknown.</a:t>
             </a:r>
             <a:r>
               <a:rPr lang="en-US" dirty="0"/>
-              <a:t>Promo2 – Appears if Promo2 = 0, it never was offered and the date values are truly unknown. </a:t>
+              <a:t> </a:t>
             </a:r>
           </a:p>
           <a:p>
             <a:pPr lvl="2"/>
-            <a:endParaRPr lang="en-US" dirty="0" smtClean="0"/>
+            <a:endParaRPr lang="en-US" dirty="0"/>
           </a:p>
         </p:txBody>
       </p:sp>
@@ -5319,14 +6934,9 @@
           <a:lstStyle/>
           <a:p>
             <a:r>
-              <a:rPr lang="en-US" u="sng" dirty="0" smtClean="0"/>
-              <a:t>Imputing Missing </a:t>
-            </a:r>
-            <a:r>
-              <a:rPr lang="en-US" u="sng" dirty="0" smtClean="0"/>
-              <a:t>Values</a:t>
-            </a:r>
-            <a:endParaRPr lang="en-US" u="sng" dirty="0"/>
+              <a:rPr lang="en-US" sz="4000" u="sng" dirty="0"/>
+              <a:t>Imputing Missing Values</a:t>
+            </a:r>
           </a:p>
         </p:txBody>
       </p:sp>
@@ -5354,54 +6964,53 @@
           <a:p>
             <a:pPr lvl="1"/>
             <a:r>
-              <a:rPr lang="en-US" sz="2400" dirty="0" smtClean="0"/>
+              <a:rPr lang="en-US" sz="2400" dirty="0"/>
               <a:t>Competition Distance –  May not be worth the time (3 stores)</a:t>
             </a:r>
           </a:p>
           <a:p>
             <a:pPr lvl="2"/>
             <a:r>
-              <a:rPr lang="en-US" sz="2200" dirty="0" smtClean="0"/>
+              <a:rPr lang="en-US" sz="2200" dirty="0"/>
               <a:t>No single other attribute appears to be predictive of Competition Distance</a:t>
             </a:r>
           </a:p>
           <a:p>
             <a:pPr lvl="2"/>
             <a:r>
-              <a:rPr lang="en-US" sz="2200" dirty="0" smtClean="0"/>
+              <a:rPr lang="en-US" sz="2200" dirty="0"/>
               <a:t>Perhaps we can use K-means clustering to find similar stores?</a:t>
             </a:r>
           </a:p>
           <a:p>
             <a:pPr lvl="3"/>
             <a:r>
-              <a:rPr lang="en-US" sz="2000" dirty="0" smtClean="0"/>
+              <a:rPr lang="en-US" sz="2000" dirty="0"/>
               <a:t>Then impute based on an average of Competition Distance of similar stores?</a:t>
             </a:r>
-            <a:endParaRPr lang="en-US" sz="2000" dirty="0" smtClean="0"/>
           </a:p>
           <a:p>
             <a:pPr lvl="1"/>
-            <a:endParaRPr lang="en-US" sz="2400" dirty="0" smtClean="0"/>
+            <a:endParaRPr lang="en-US" sz="2400" dirty="0"/>
           </a:p>
           <a:p>
             <a:pPr lvl="1"/>
             <a:r>
-              <a:rPr lang="en-US" sz="2400" dirty="0" smtClean="0"/>
+              <a:rPr lang="en-US" sz="2400" dirty="0"/>
               <a:t>Competition Open Date – Highly missing, but may be predictive </a:t>
             </a:r>
           </a:p>
           <a:p>
             <a:pPr lvl="2"/>
             <a:r>
-              <a:rPr lang="en-US" sz="2200" dirty="0" smtClean="0"/>
+              <a:rPr lang="en-US" sz="2200" dirty="0"/>
               <a:t>No other attributes seem to be predictive of Open Date</a:t>
             </a:r>
           </a:p>
           <a:p>
             <a:pPr lvl="2"/>
             <a:r>
-              <a:rPr lang="en-US" sz="2200" dirty="0" smtClean="0"/>
+              <a:rPr lang="en-US" sz="2200" dirty="0"/>
               <a:t>Perhaps we can use K-means clustering to find similar stores?</a:t>
             </a:r>
           </a:p>
@@ -5409,22 +7018,21 @@
             <a:pPr marL="231775" lvl="1" indent="0">
               <a:buNone/>
             </a:pPr>
-            <a:endParaRPr lang="en-US" sz="2400" dirty="0" smtClean="0"/>
+            <a:endParaRPr lang="en-US" sz="2400" dirty="0"/>
           </a:p>
           <a:p>
             <a:pPr lvl="1"/>
             <a:r>
-              <a:rPr lang="en-US" sz="2400" dirty="0" smtClean="0"/>
+              <a:rPr lang="en-US" sz="2400" dirty="0"/>
               <a:t>Promo2 Start Date – No need</a:t>
             </a:r>
           </a:p>
           <a:p>
             <a:pPr lvl="2"/>
             <a:r>
-              <a:rPr lang="en-US" sz="2200" dirty="0" smtClean="0"/>
+              <a:rPr lang="en-US" sz="2200" dirty="0"/>
               <a:t>When Promo2 = 0, the promo was not offered</a:t>
             </a:r>
-            <a:endParaRPr lang="en-US" sz="2200" dirty="0" smtClean="0"/>
           </a:p>
         </p:txBody>
       </p:sp>
@@ -5491,10 +7099,9 @@
           <a:lstStyle/>
           <a:p>
             <a:r>
-              <a:rPr lang="en-US" dirty="0" smtClean="0"/>
+              <a:rPr lang="en-US" dirty="0"/>
               <a:t>Feature Engineering</a:t>
             </a:r>
-            <a:endParaRPr lang="en-US" dirty="0"/>
           </a:p>
         </p:txBody>
       </p:sp>
@@ -5580,10 +7187,9 @@
           <a:lstStyle/>
           <a:p>
             <a:r>
-              <a:rPr lang="en-US" dirty="0" smtClean="0"/>
+              <a:rPr lang="en-US" dirty="0"/>
               <a:t>Features We Engineered: </a:t>
             </a:r>
-            <a:endParaRPr lang="en-US" dirty="0"/>
           </a:p>
         </p:txBody>
       </p:sp>

</xml_diff>